<commit_message>
feat: add new slide (Prós e Contras) to `Aula 2`
</commit_message>
<xml_diff>
--- a/Aula 02/IntroduçãoBD.pptx
+++ b/Aula 02/IntroduçãoBD.pptx
@@ -7,14 +7,15 @@
   <p:sldIdLst>
     <p:sldId id="256" r:id="rId2"/>
     <p:sldId id="257" r:id="rId3"/>
-    <p:sldId id="258" r:id="rId4"/>
-    <p:sldId id="260" r:id="rId5"/>
-    <p:sldId id="259" r:id="rId6"/>
-    <p:sldId id="271" r:id="rId7"/>
-    <p:sldId id="272" r:id="rId8"/>
-    <p:sldId id="264" r:id="rId9"/>
-    <p:sldId id="263" r:id="rId10"/>
-    <p:sldId id="261" r:id="rId11"/>
+    <p:sldId id="273" r:id="rId4"/>
+    <p:sldId id="258" r:id="rId5"/>
+    <p:sldId id="260" r:id="rId6"/>
+    <p:sldId id="259" r:id="rId7"/>
+    <p:sldId id="271" r:id="rId8"/>
+    <p:sldId id="272" r:id="rId9"/>
+    <p:sldId id="264" r:id="rId10"/>
+    <p:sldId id="263" r:id="rId11"/>
+    <p:sldId id="261" r:id="rId12"/>
   </p:sldIdLst>
   <p:sldSz cx="12192000" cy="6858000"/>
   <p:notesSz cx="6858000" cy="9144000"/>
@@ -268,7 +269,7 @@
           <a:p>
             <a:fld id="{0293E696-207E-4958-8130-FF51108F7A86}" type="datetimeFigureOut">
               <a:rPr lang="pt-BR" smtClean="0"/>
-              <a:t>23/01/2026</a:t>
+              <a:t>13/02/2026</a:t>
             </a:fld>
             <a:endParaRPr lang="pt-BR"/>
           </a:p>
@@ -466,7 +467,7 @@
           <a:p>
             <a:fld id="{0293E696-207E-4958-8130-FF51108F7A86}" type="datetimeFigureOut">
               <a:rPr lang="pt-BR" smtClean="0"/>
-              <a:t>23/01/2026</a:t>
+              <a:t>13/02/2026</a:t>
             </a:fld>
             <a:endParaRPr lang="pt-BR"/>
           </a:p>
@@ -674,7 +675,7 @@
           <a:p>
             <a:fld id="{0293E696-207E-4958-8130-FF51108F7A86}" type="datetimeFigureOut">
               <a:rPr lang="pt-BR" smtClean="0"/>
-              <a:t>23/01/2026</a:t>
+              <a:t>13/02/2026</a:t>
             </a:fld>
             <a:endParaRPr lang="pt-BR"/>
           </a:p>
@@ -872,7 +873,7 @@
           <a:p>
             <a:fld id="{0293E696-207E-4958-8130-FF51108F7A86}" type="datetimeFigureOut">
               <a:rPr lang="pt-BR" smtClean="0"/>
-              <a:t>23/01/2026</a:t>
+              <a:t>13/02/2026</a:t>
             </a:fld>
             <a:endParaRPr lang="pt-BR"/>
           </a:p>
@@ -1147,7 +1148,7 @@
           <a:p>
             <a:fld id="{0293E696-207E-4958-8130-FF51108F7A86}" type="datetimeFigureOut">
               <a:rPr lang="pt-BR" smtClean="0"/>
-              <a:t>23/01/2026</a:t>
+              <a:t>13/02/2026</a:t>
             </a:fld>
             <a:endParaRPr lang="pt-BR"/>
           </a:p>
@@ -1412,7 +1413,7 @@
           <a:p>
             <a:fld id="{0293E696-207E-4958-8130-FF51108F7A86}" type="datetimeFigureOut">
               <a:rPr lang="pt-BR" smtClean="0"/>
-              <a:t>23/01/2026</a:t>
+              <a:t>13/02/2026</a:t>
             </a:fld>
             <a:endParaRPr lang="pt-BR"/>
           </a:p>
@@ -1824,7 +1825,7 @@
           <a:p>
             <a:fld id="{0293E696-207E-4958-8130-FF51108F7A86}" type="datetimeFigureOut">
               <a:rPr lang="pt-BR" smtClean="0"/>
-              <a:t>23/01/2026</a:t>
+              <a:t>13/02/2026</a:t>
             </a:fld>
             <a:endParaRPr lang="pt-BR"/>
           </a:p>
@@ -1965,7 +1966,7 @@
           <a:p>
             <a:fld id="{0293E696-207E-4958-8130-FF51108F7A86}" type="datetimeFigureOut">
               <a:rPr lang="pt-BR" smtClean="0"/>
-              <a:t>23/01/2026</a:t>
+              <a:t>13/02/2026</a:t>
             </a:fld>
             <a:endParaRPr lang="pt-BR"/>
           </a:p>
@@ -2078,7 +2079,7 @@
           <a:p>
             <a:fld id="{0293E696-207E-4958-8130-FF51108F7A86}" type="datetimeFigureOut">
               <a:rPr lang="pt-BR" smtClean="0"/>
-              <a:t>23/01/2026</a:t>
+              <a:t>13/02/2026</a:t>
             </a:fld>
             <a:endParaRPr lang="pt-BR"/>
           </a:p>
@@ -2389,7 +2390,7 @@
           <a:p>
             <a:fld id="{0293E696-207E-4958-8130-FF51108F7A86}" type="datetimeFigureOut">
               <a:rPr lang="pt-BR" smtClean="0"/>
-              <a:t>23/01/2026</a:t>
+              <a:t>13/02/2026</a:t>
             </a:fld>
             <a:endParaRPr lang="pt-BR"/>
           </a:p>
@@ -2677,7 +2678,7 @@
           <a:p>
             <a:fld id="{0293E696-207E-4958-8130-FF51108F7A86}" type="datetimeFigureOut">
               <a:rPr lang="pt-BR" smtClean="0"/>
-              <a:t>23/01/2026</a:t>
+              <a:t>13/02/2026</a:t>
             </a:fld>
             <a:endParaRPr lang="pt-BR"/>
           </a:p>
@@ -2918,7 +2919,7 @@
           <a:p>
             <a:fld id="{0293E696-207E-4958-8130-FF51108F7A86}" type="datetimeFigureOut">
               <a:rPr lang="pt-BR" smtClean="0"/>
-              <a:t>23/01/2026</a:t>
+              <a:t>13/02/2026</a:t>
             </a:fld>
             <a:endParaRPr lang="pt-BR"/>
           </a:p>
@@ -3592,6 +3593,370 @@
         <p:cNvPr id="1" name="">
           <a:extLst>
             <a:ext uri="{FF2B5EF4-FFF2-40B4-BE49-F238E27FC236}">
+              <a16:creationId xmlns:a16="http://schemas.microsoft.com/office/drawing/2014/main" id="{5E8A27A6-8EF8-12D8-8FD8-D7F39147A30A}"/>
+            </a:ext>
+          </a:extLst>
+        </p:cNvPr>
+        <p:cNvGrpSpPr/>
+        <p:nvPr/>
+      </p:nvGrpSpPr>
+      <p:grpSpPr>
+        <a:xfrm>
+          <a:off x="0" y="0"/>
+          <a:ext cx="0" cy="0"/>
+          <a:chOff x="0" y="0"/>
+          <a:chExt cx="0" cy="0"/>
+        </a:xfrm>
+      </p:grpSpPr>
+      <p:sp>
+        <p:nvSpPr>
+          <p:cNvPr id="2" name="Título 1">
+            <a:extLst>
+              <a:ext uri="{FF2B5EF4-FFF2-40B4-BE49-F238E27FC236}">
+                <a16:creationId xmlns:a16="http://schemas.microsoft.com/office/drawing/2014/main" id="{6BF18DC9-5815-0212-B6E0-D8C10E6A492B}"/>
+              </a:ext>
+            </a:extLst>
+          </p:cNvPr>
+          <p:cNvSpPr>
+            <a:spLocks noGrp="1"/>
+          </p:cNvSpPr>
+          <p:nvPr>
+            <p:ph type="title"/>
+          </p:nvPr>
+        </p:nvSpPr>
+        <p:spPr/>
+        <p:txBody>
+          <a:bodyPr/>
+          <a:lstStyle/>
+          <a:p>
+            <a:endParaRPr lang="pt-BR"/>
+          </a:p>
+        </p:txBody>
+      </p:sp>
+      <p:sp>
+        <p:nvSpPr>
+          <p:cNvPr id="3" name="Espaço Reservado para Conteúdo 2">
+            <a:extLst>
+              <a:ext uri="{FF2B5EF4-FFF2-40B4-BE49-F238E27FC236}">
+                <a16:creationId xmlns:a16="http://schemas.microsoft.com/office/drawing/2014/main" id="{4A8E3B4E-2F8A-3689-618B-A91B245EFDE0}"/>
+              </a:ext>
+            </a:extLst>
+          </p:cNvPr>
+          <p:cNvSpPr>
+            <a:spLocks noGrp="1"/>
+          </p:cNvSpPr>
+          <p:nvPr>
+            <p:ph idx="1"/>
+          </p:nvPr>
+        </p:nvSpPr>
+        <p:spPr/>
+        <p:txBody>
+          <a:bodyPr/>
+          <a:lstStyle/>
+          <a:p>
+            <a:endParaRPr lang="pt-BR"/>
+          </a:p>
+        </p:txBody>
+      </p:sp>
+      <p:pic>
+        <p:nvPicPr>
+          <p:cNvPr id="4" name="Imagem 3">
+            <a:extLst>
+              <a:ext uri="{FF2B5EF4-FFF2-40B4-BE49-F238E27FC236}">
+                <a16:creationId xmlns:a16="http://schemas.microsoft.com/office/drawing/2014/main" id="{81421DD0-6686-3CBC-6B71-56FD159EB670}"/>
+              </a:ext>
+            </a:extLst>
+          </p:cNvPr>
+          <p:cNvPicPr>
+            <a:picLocks noChangeAspect="1"/>
+          </p:cNvPicPr>
+          <p:nvPr/>
+        </p:nvPicPr>
+        <p:blipFill>
+          <a:blip r:embed="rId2">
+            <a:extLst>
+              <a:ext uri="{28A0092B-C50C-407E-A947-70E740481C1C}">
+                <a14:useLocalDpi xmlns:a14="http://schemas.microsoft.com/office/drawing/2010/main" val="0"/>
+              </a:ext>
+            </a:extLst>
+          </a:blip>
+          <a:stretch>
+            <a:fillRect/>
+          </a:stretch>
+        </p:blipFill>
+        <p:spPr>
+          <a:xfrm>
+            <a:off x="0" y="0"/>
+            <a:ext cx="12192000" cy="6858000"/>
+          </a:xfrm>
+          <a:prstGeom prst="rect">
+            <a:avLst/>
+          </a:prstGeom>
+        </p:spPr>
+      </p:pic>
+      <p:sp>
+        <p:nvSpPr>
+          <p:cNvPr id="5" name="CaixaDeTexto 4">
+            <a:extLst>
+              <a:ext uri="{FF2B5EF4-FFF2-40B4-BE49-F238E27FC236}">
+                <a16:creationId xmlns:a16="http://schemas.microsoft.com/office/drawing/2014/main" id="{37296BF4-EF26-F538-26E9-4DC854B48CD9}"/>
+              </a:ext>
+            </a:extLst>
+          </p:cNvPr>
+          <p:cNvSpPr txBox="1"/>
+          <p:nvPr/>
+        </p:nvSpPr>
+        <p:spPr>
+          <a:xfrm>
+            <a:off x="386861" y="202223"/>
+            <a:ext cx="9064869" cy="2862322"/>
+          </a:xfrm>
+          <a:prstGeom prst="rect">
+            <a:avLst/>
+          </a:prstGeom>
+          <a:noFill/>
+        </p:spPr>
+        <p:txBody>
+          <a:bodyPr wrap="square" rtlCol="0">
+            <a:spAutoFit/>
+          </a:bodyPr>
+          <a:lstStyle/>
+          <a:p>
+            <a:r>
+              <a:rPr lang="en-US" sz="3600" dirty="0" err="1"/>
+              <a:t>Instalação</a:t>
+            </a:r>
+            <a:r>
+              <a:rPr lang="en-US" sz="3600" dirty="0"/>
+              <a:t> do MySQL Workbench</a:t>
+            </a:r>
+          </a:p>
+          <a:p>
+            <a:endParaRPr lang="en-US" sz="3600" dirty="0"/>
+          </a:p>
+          <a:p>
+            <a:pPr marL="285750" indent="-285750">
+              <a:buFont typeface="Wingdings" panose="05000000000000000000" pitchFamily="2" charset="2"/>
+              <a:buChar char="Ø"/>
+            </a:pPr>
+            <a:r>
+              <a:rPr lang="en-US" dirty="0" err="1"/>
+              <a:t>Vídeo</a:t>
+            </a:r>
+            <a:r>
+              <a:rPr lang="en-US" dirty="0"/>
+              <a:t> com </a:t>
+            </a:r>
+            <a:r>
+              <a:rPr lang="en-US" dirty="0" err="1"/>
+              <a:t>os</a:t>
+            </a:r>
+            <a:r>
+              <a:rPr lang="en-US" dirty="0"/>
+              <a:t> </a:t>
+            </a:r>
+            <a:r>
+              <a:rPr lang="en-US" dirty="0" err="1"/>
+              <a:t>detalhes</a:t>
+            </a:r>
+            <a:r>
+              <a:rPr lang="en-US" dirty="0"/>
+              <a:t> da </a:t>
+            </a:r>
+            <a:r>
+              <a:rPr lang="en-US" dirty="0" err="1"/>
+              <a:t>instalação</a:t>
+            </a:r>
+            <a:r>
+              <a:rPr lang="en-US" dirty="0"/>
+              <a:t> no canal do Teams.</a:t>
+            </a:r>
+          </a:p>
+          <a:p>
+            <a:pPr marL="285750" indent="-285750">
+              <a:buFont typeface="Wingdings" panose="05000000000000000000" pitchFamily="2" charset="2"/>
+              <a:buChar char="Ø"/>
+            </a:pPr>
+            <a:r>
+              <a:rPr lang="en-US" dirty="0" err="1"/>
+              <a:t>Arquivo</a:t>
+            </a:r>
+            <a:r>
+              <a:rPr lang="en-US" dirty="0"/>
+              <a:t> com </a:t>
+            </a:r>
+            <a:r>
+              <a:rPr lang="en-US" dirty="0" err="1"/>
+              <a:t>todos</a:t>
+            </a:r>
+            <a:r>
+              <a:rPr lang="en-US" dirty="0"/>
+              <a:t> </a:t>
+            </a:r>
+            <a:r>
+              <a:rPr lang="en-US" dirty="0" err="1"/>
+              <a:t>os</a:t>
+            </a:r>
+            <a:r>
+              <a:rPr lang="en-US" dirty="0"/>
+              <a:t> </a:t>
+            </a:r>
+            <a:r>
+              <a:rPr lang="en-US" dirty="0" err="1"/>
+              <a:t>detalhes</a:t>
+            </a:r>
+            <a:r>
+              <a:rPr lang="en-US" dirty="0"/>
+              <a:t> no TEAMS </a:t>
+            </a:r>
+            <a:r>
+              <a:rPr lang="en-US" dirty="0" err="1"/>
+              <a:t>ou</a:t>
+            </a:r>
+            <a:r>
+              <a:rPr lang="en-US" dirty="0"/>
+              <a:t> no meu </a:t>
+            </a:r>
+            <a:r>
+              <a:rPr lang="en-US" dirty="0" err="1"/>
+              <a:t>repositório</a:t>
+            </a:r>
+            <a:r>
+              <a:rPr lang="en-US" dirty="0"/>
+              <a:t> da </a:t>
+            </a:r>
+            <a:r>
+              <a:rPr lang="en-US" dirty="0" err="1"/>
+              <a:t>disciplina</a:t>
+            </a:r>
+            <a:r>
+              <a:rPr lang="en-US" dirty="0"/>
+              <a:t> no </a:t>
+            </a:r>
+            <a:r>
+              <a:rPr lang="en-US" dirty="0" err="1"/>
+              <a:t>Github</a:t>
+            </a:r>
+            <a:r>
+              <a:rPr lang="en-US" dirty="0"/>
+              <a:t>.</a:t>
+            </a:r>
+          </a:p>
+          <a:p>
+            <a:pPr marL="285750" indent="-285750">
+              <a:buFont typeface="Wingdings" panose="05000000000000000000" pitchFamily="2" charset="2"/>
+              <a:buChar char="Ø"/>
+            </a:pPr>
+            <a:r>
+              <a:rPr lang="en-US" dirty="0"/>
+              <a:t>IMPORTANTE: para </a:t>
+            </a:r>
+            <a:r>
+              <a:rPr lang="en-US" dirty="0" err="1"/>
+              <a:t>facilitar</a:t>
+            </a:r>
+            <a:r>
+              <a:rPr lang="en-US" dirty="0"/>
+              <a:t> entradas posteriores (</a:t>
+            </a:r>
+            <a:r>
+              <a:rPr lang="en-US" dirty="0" err="1"/>
+              <a:t>principalmente</a:t>
+            </a:r>
+            <a:r>
+              <a:rPr lang="en-US" dirty="0"/>
+              <a:t> no </a:t>
+            </a:r>
+            <a:r>
+              <a:rPr lang="en-US" dirty="0" err="1"/>
+              <a:t>projeto</a:t>
+            </a:r>
+            <a:r>
+              <a:rPr lang="en-US" dirty="0"/>
+              <a:t>), </a:t>
+            </a:r>
+            <a:r>
+              <a:rPr lang="en-US" dirty="0" err="1"/>
+              <a:t>recomendo</a:t>
+            </a:r>
+            <a:r>
+              <a:rPr lang="en-US" dirty="0"/>
+              <a:t> </a:t>
+            </a:r>
+            <a:r>
+              <a:rPr lang="en-US" dirty="0" err="1"/>
+              <a:t>colocar</a:t>
+            </a:r>
+            <a:r>
+              <a:rPr lang="en-US" dirty="0"/>
+              <a:t> o </a:t>
+            </a:r>
+            <a:r>
+              <a:rPr lang="en-US" b="1" u="sng" dirty="0" err="1"/>
+              <a:t>nome</a:t>
+            </a:r>
+            <a:r>
+              <a:rPr lang="en-US" b="1" u="sng" dirty="0"/>
+              <a:t> de </a:t>
+            </a:r>
+            <a:r>
+              <a:rPr lang="en-US" b="1" u="sng" dirty="0" err="1"/>
+              <a:t>usuário</a:t>
+            </a:r>
+            <a:r>
+              <a:rPr lang="en-US" b="1" u="sng" dirty="0"/>
+              <a:t> e </a:t>
+            </a:r>
+            <a:r>
+              <a:rPr lang="en-US" b="1" u="sng" dirty="0" err="1"/>
+              <a:t>senha</a:t>
+            </a:r>
+            <a:r>
+              <a:rPr lang="en-US" b="1" u="sng" dirty="0"/>
+              <a:t> </a:t>
+            </a:r>
+            <a:r>
+              <a:rPr lang="en-US" b="1" u="sng" dirty="0" err="1"/>
+              <a:t>como</a:t>
+            </a:r>
+            <a:r>
+              <a:rPr lang="en-US" b="1" u="sng" dirty="0"/>
+              <a:t> “root”</a:t>
+            </a:r>
+            <a:r>
+              <a:rPr lang="en-US" dirty="0"/>
+              <a:t>.</a:t>
+            </a:r>
+          </a:p>
+          <a:p>
+            <a:endParaRPr lang="en-US" dirty="0"/>
+          </a:p>
+          <a:p>
+            <a:endParaRPr lang="pt-BR" dirty="0"/>
+          </a:p>
+        </p:txBody>
+      </p:sp>
+    </p:spTree>
+    <p:extLst>
+      <p:ext uri="{BB962C8B-B14F-4D97-AF65-F5344CB8AC3E}">
+        <p14:creationId xmlns:p14="http://schemas.microsoft.com/office/powerpoint/2010/main" val="3734812818"/>
+      </p:ext>
+    </p:extLst>
+  </p:cSld>
+  <p:clrMapOvr>
+    <a:masterClrMapping/>
+  </p:clrMapOvr>
+</p:sld>
+</file>
+
+<file path=ppt/slides/slide11.xml><?xml version="1.0" encoding="utf-8"?>
+<p:sld xmlns:a="http://schemas.openxmlformats.org/drawingml/2006/main" xmlns:r="http://schemas.openxmlformats.org/officeDocument/2006/relationships" xmlns:p="http://schemas.openxmlformats.org/presentationml/2006/main">
+  <p:cSld>
+    <p:spTree>
+      <p:nvGrpSpPr>
+        <p:cNvPr id="1" name="">
+          <a:extLst>
+            <a:ext uri="{FF2B5EF4-FFF2-40B4-BE49-F238E27FC236}">
               <a16:creationId xmlns:a16="http://schemas.microsoft.com/office/drawing/2014/main" id="{A9F73D6E-FC32-50DA-1CBC-9FDC465B155C}"/>
             </a:ext>
           </a:extLst>
@@ -3998,7 +4363,13 @@
   <p:cSld>
     <p:spTree>
       <p:nvGrpSpPr>
-        <p:cNvPr id="1" name=""/>
+        <p:cNvPr id="1" name="">
+          <a:extLst>
+            <a:ext uri="{FF2B5EF4-FFF2-40B4-BE49-F238E27FC236}">
+              <a16:creationId xmlns:a16="http://schemas.microsoft.com/office/drawing/2014/main" id="{4647B96E-3FEB-82EB-1226-CA1E0E4BF3A7}"/>
+            </a:ext>
+          </a:extLst>
+        </p:cNvPr>
         <p:cNvGrpSpPr/>
         <p:nvPr/>
       </p:nvGrpSpPr>
@@ -4010,62 +4381,12 @@
           <a:chExt cx="0" cy="0"/>
         </a:xfrm>
       </p:grpSpPr>
-      <p:sp>
-        <p:nvSpPr>
-          <p:cNvPr id="2" name="Título 1">
-            <a:extLst>
-              <a:ext uri="{FF2B5EF4-FFF2-40B4-BE49-F238E27FC236}">
-                <a16:creationId xmlns:a16="http://schemas.microsoft.com/office/drawing/2014/main" id="{3E24A81F-FB2A-8C0A-B028-8D100530BE72}"/>
-              </a:ext>
-            </a:extLst>
-          </p:cNvPr>
-          <p:cNvSpPr>
-            <a:spLocks noGrp="1"/>
-          </p:cNvSpPr>
-          <p:nvPr>
-            <p:ph type="title"/>
-          </p:nvPr>
-        </p:nvSpPr>
-        <p:spPr/>
-        <p:txBody>
-          <a:bodyPr/>
-          <a:lstStyle/>
-          <a:p>
-            <a:endParaRPr lang="pt-BR"/>
-          </a:p>
-        </p:txBody>
-      </p:sp>
-      <p:sp>
-        <p:nvSpPr>
-          <p:cNvPr id="3" name="Espaço Reservado para Conteúdo 2">
-            <a:extLst>
-              <a:ext uri="{FF2B5EF4-FFF2-40B4-BE49-F238E27FC236}">
-                <a16:creationId xmlns:a16="http://schemas.microsoft.com/office/drawing/2014/main" id="{130A59D2-3DFC-7F99-AA0D-6A9D525F4C43}"/>
-              </a:ext>
-            </a:extLst>
-          </p:cNvPr>
-          <p:cNvSpPr>
-            <a:spLocks noGrp="1"/>
-          </p:cNvSpPr>
-          <p:nvPr>
-            <p:ph idx="1"/>
-          </p:nvPr>
-        </p:nvSpPr>
-        <p:spPr/>
-        <p:txBody>
-          <a:bodyPr/>
-          <a:lstStyle/>
-          <a:p>
-            <a:endParaRPr lang="pt-BR"/>
-          </a:p>
-        </p:txBody>
-      </p:sp>
       <p:pic>
         <p:nvPicPr>
-          <p:cNvPr id="4" name="Imagem 3">
-            <a:extLst>
-              <a:ext uri="{FF2B5EF4-FFF2-40B4-BE49-F238E27FC236}">
-                <a16:creationId xmlns:a16="http://schemas.microsoft.com/office/drawing/2014/main" id="{34E96833-C58D-A904-75A9-1A3FBBAEBED3}"/>
+          <p:cNvPr id="5" name="Imagem 4">
+            <a:extLst>
+              <a:ext uri="{FF2B5EF4-FFF2-40B4-BE49-F238E27FC236}">
+                <a16:creationId xmlns:a16="http://schemas.microsoft.com/office/drawing/2014/main" id="{171AE479-C112-4CA3-5E71-78C9A350DC34}"/>
               </a:ext>
             </a:extLst>
           </p:cNvPr>
@@ -4088,7 +4409,7 @@
         </p:blipFill>
         <p:spPr>
           <a:xfrm>
-            <a:off x="0" y="-1"/>
+            <a:off x="0" y="0"/>
             <a:ext cx="12192000" cy="6858000"/>
           </a:xfrm>
           <a:prstGeom prst="rect">
@@ -4098,10 +4419,10 @@
       </p:pic>
       <p:sp>
         <p:nvSpPr>
-          <p:cNvPr id="5" name="CaixaDeTexto 4">
-            <a:extLst>
-              <a:ext uri="{FF2B5EF4-FFF2-40B4-BE49-F238E27FC236}">
-                <a16:creationId xmlns:a16="http://schemas.microsoft.com/office/drawing/2014/main" id="{9B183E33-21E7-CBCA-C10C-9C7F7F4252F7}"/>
+          <p:cNvPr id="6" name="CaixaDeTexto 5">
+            <a:extLst>
+              <a:ext uri="{FF2B5EF4-FFF2-40B4-BE49-F238E27FC236}">
+                <a16:creationId xmlns:a16="http://schemas.microsoft.com/office/drawing/2014/main" id="{D6E48C7D-7FA0-AEA3-BFEF-16BEA8D03DB2}"/>
               </a:ext>
             </a:extLst>
           </p:cNvPr>
@@ -4110,8 +4431,8 @@
         </p:nvSpPr>
         <p:spPr>
           <a:xfrm>
-            <a:off x="5361784" y="507245"/>
-            <a:ext cx="1679332" cy="646331"/>
+            <a:off x="2831123" y="1362808"/>
+            <a:ext cx="1107831" cy="584775"/>
           </a:xfrm>
           <a:prstGeom prst="rect">
             <a:avLst/>
@@ -4124,138 +4445,21 @@
           </a:bodyPr>
           <a:lstStyle/>
           <a:p>
-            <a:r>
-              <a:rPr lang="en-US" sz="3600" dirty="0"/>
-              <a:t>Tabelas</a:t>
-            </a:r>
-            <a:endParaRPr lang="pt-BR" sz="3600" dirty="0"/>
-          </a:p>
-        </p:txBody>
-      </p:sp>
-      <p:pic>
-        <p:nvPicPr>
-          <p:cNvPr id="7" name="Imagem 6">
-            <a:extLst>
-              <a:ext uri="{FF2B5EF4-FFF2-40B4-BE49-F238E27FC236}">
-                <a16:creationId xmlns:a16="http://schemas.microsoft.com/office/drawing/2014/main" id="{F7A7230C-3228-D2F1-D70B-D45A7FAEE926}"/>
-              </a:ext>
-            </a:extLst>
-          </p:cNvPr>
-          <p:cNvPicPr>
-            <a:picLocks noChangeAspect="1"/>
-          </p:cNvPicPr>
-          <p:nvPr/>
-        </p:nvPicPr>
-        <p:blipFill>
-          <a:blip r:embed="rId3"/>
-          <a:stretch>
-            <a:fillRect/>
-          </a:stretch>
-        </p:blipFill>
-        <p:spPr>
-          <a:xfrm>
-            <a:off x="938771" y="2350851"/>
-            <a:ext cx="1952898" cy="2276793"/>
-          </a:xfrm>
-          <a:prstGeom prst="rect">
-            <a:avLst/>
-          </a:prstGeom>
-          <a:ln>
-            <a:noFill/>
-          </a:ln>
-          <a:effectLst>
-            <a:softEdge rad="112500"/>
-          </a:effectLst>
-        </p:spPr>
-      </p:pic>
-      <p:pic>
-        <p:nvPicPr>
-          <p:cNvPr id="9" name="Imagem 8">
-            <a:extLst>
-              <a:ext uri="{FF2B5EF4-FFF2-40B4-BE49-F238E27FC236}">
-                <a16:creationId xmlns:a16="http://schemas.microsoft.com/office/drawing/2014/main" id="{819C0B14-793A-F183-C623-67F4538F60E0}"/>
-              </a:ext>
-            </a:extLst>
-          </p:cNvPr>
-          <p:cNvPicPr>
-            <a:picLocks noChangeAspect="1"/>
-          </p:cNvPicPr>
-          <p:nvPr/>
-        </p:nvPicPr>
-        <p:blipFill>
-          <a:blip r:embed="rId4"/>
-          <a:stretch>
-            <a:fillRect/>
-          </a:stretch>
-        </p:blipFill>
-        <p:spPr>
-          <a:xfrm>
-            <a:off x="6201450" y="2523392"/>
-            <a:ext cx="5323292" cy="2040968"/>
-          </a:xfrm>
-          <a:prstGeom prst="rect">
-            <a:avLst/>
-          </a:prstGeom>
-          <a:ln>
-            <a:noFill/>
-          </a:ln>
-          <a:effectLst>
-            <a:outerShdw blurRad="292100" dist="139700" dir="2700000" algn="tl" rotWithShape="0">
-              <a:srgbClr val="333333">
-                <a:alpha val="65000"/>
-              </a:srgbClr>
-            </a:outerShdw>
-          </a:effectLst>
-        </p:spPr>
-      </p:pic>
-      <p:cxnSp>
-        <p:nvCxnSpPr>
-          <p:cNvPr id="11" name="Conector de Seta Reta 10">
-            <a:extLst>
-              <a:ext uri="{FF2B5EF4-FFF2-40B4-BE49-F238E27FC236}">
-                <a16:creationId xmlns:a16="http://schemas.microsoft.com/office/drawing/2014/main" id="{B5A1F8F2-3D47-AFBA-07AB-CC6C2B6C6107}"/>
-              </a:ext>
-            </a:extLst>
-          </p:cNvPr>
-          <p:cNvCxnSpPr>
-            <a:cxnSpLocks/>
-          </p:cNvCxnSpPr>
-          <p:nvPr/>
-        </p:nvCxnSpPr>
-        <p:spPr>
-          <a:xfrm>
-            <a:off x="3226777" y="3443547"/>
-            <a:ext cx="2461846" cy="0"/>
-          </a:xfrm>
-          <a:prstGeom prst="straightConnector1">
-            <a:avLst/>
-          </a:prstGeom>
-          <a:ln>
-            <a:headEnd type="triangle"/>
-            <a:tailEnd type="triangle"/>
-          </a:ln>
-        </p:spPr>
-        <p:style>
-          <a:lnRef idx="1">
-            <a:schemeClr val="dk1"/>
-          </a:lnRef>
-          <a:fillRef idx="0">
-            <a:schemeClr val="dk1"/>
-          </a:fillRef>
-          <a:effectRef idx="0">
-            <a:schemeClr val="dk1"/>
-          </a:effectRef>
-          <a:fontRef idx="minor">
-            <a:schemeClr val="tx1"/>
-          </a:fontRef>
-        </p:style>
-      </p:cxnSp>
-      <p:sp>
-        <p:nvSpPr>
-          <p:cNvPr id="12" name="CaixaDeTexto 11">
-            <a:extLst>
-              <a:ext uri="{FF2B5EF4-FFF2-40B4-BE49-F238E27FC236}">
-                <a16:creationId xmlns:a16="http://schemas.microsoft.com/office/drawing/2014/main" id="{51F69BD2-7A79-07E2-2082-7D0BE7DD3F87}"/>
+            <a:pPr algn="ctr"/>
+            <a:r>
+              <a:rPr lang="en-US" sz="3200" dirty="0" err="1"/>
+              <a:t>Prós</a:t>
+            </a:r>
+            <a:endParaRPr lang="en-US" sz="3200" dirty="0"/>
+          </a:p>
+        </p:txBody>
+      </p:sp>
+      <p:sp>
+        <p:nvSpPr>
+          <p:cNvPr id="10" name="CaixaDeTexto 9">
+            <a:extLst>
+              <a:ext uri="{FF2B5EF4-FFF2-40B4-BE49-F238E27FC236}">
+                <a16:creationId xmlns:a16="http://schemas.microsoft.com/office/drawing/2014/main" id="{711790C2-FF9A-9204-0D19-06D81072AE06}"/>
               </a:ext>
             </a:extLst>
           </p:cNvPr>
@@ -4264,8 +4468,8 @@
         </p:nvSpPr>
         <p:spPr>
           <a:xfrm>
-            <a:off x="1231115" y="4627644"/>
-            <a:ext cx="1368209" cy="646331"/>
+            <a:off x="4785213" y="428583"/>
+            <a:ext cx="2621573" cy="584775"/>
           </a:xfrm>
           <a:prstGeom prst="rect">
             <a:avLst/>
@@ -4279,19 +4483,23 @@
           <a:lstStyle/>
           <a:p>
             <a:r>
-              <a:rPr lang="en-US" dirty="0"/>
-              <a:t>Modelo do Workbench</a:t>
-            </a:r>
-            <a:endParaRPr lang="pt-BR" dirty="0"/>
-          </a:p>
-        </p:txBody>
-      </p:sp>
-      <p:sp>
-        <p:nvSpPr>
-          <p:cNvPr id="13" name="CaixaDeTexto 12">
-            <a:extLst>
-              <a:ext uri="{FF2B5EF4-FFF2-40B4-BE49-F238E27FC236}">
-                <a16:creationId xmlns:a16="http://schemas.microsoft.com/office/drawing/2014/main" id="{56579E6D-0B72-D7FC-6459-168E6428A857}"/>
+              <a:rPr lang="en-US" sz="3200" dirty="0" err="1"/>
+              <a:t>Prós</a:t>
+            </a:r>
+            <a:r>
+              <a:rPr lang="en-US" sz="3200" dirty="0"/>
+              <a:t> e Contras</a:t>
+            </a:r>
+            <a:endParaRPr lang="pt-BR" sz="3200" dirty="0"/>
+          </a:p>
+        </p:txBody>
+      </p:sp>
+      <p:sp>
+        <p:nvSpPr>
+          <p:cNvPr id="2" name="CaixaDeTexto 1">
+            <a:extLst>
+              <a:ext uri="{FF2B5EF4-FFF2-40B4-BE49-F238E27FC236}">
+                <a16:creationId xmlns:a16="http://schemas.microsoft.com/office/drawing/2014/main" id="{0AA8A664-F2E7-B048-DDBB-08A95E1562AD}"/>
               </a:ext>
             </a:extLst>
           </p:cNvPr>
@@ -4300,8 +4508,8 @@
         </p:nvSpPr>
         <p:spPr>
           <a:xfrm>
-            <a:off x="8084599" y="4892787"/>
-            <a:ext cx="1556994" cy="381188"/>
+            <a:off x="7833946" y="1362808"/>
+            <a:ext cx="1526931" cy="584775"/>
           </a:xfrm>
           <a:prstGeom prst="rect">
             <a:avLst/>
@@ -4314,18 +4522,161 @@
           </a:bodyPr>
           <a:lstStyle/>
           <a:p>
-            <a:r>
-              <a:rPr lang="en-US" dirty="0"/>
-              <a:t>Tabela Simples</a:t>
-            </a:r>
+            <a:pPr algn="ctr"/>
+            <a:r>
+              <a:rPr lang="pt-BR" sz="3200" dirty="0"/>
+              <a:t>Contras</a:t>
+            </a:r>
+          </a:p>
+        </p:txBody>
+      </p:sp>
+      <p:sp>
+        <p:nvSpPr>
+          <p:cNvPr id="3" name="CaixaDeTexto 2">
+            <a:extLst>
+              <a:ext uri="{FF2B5EF4-FFF2-40B4-BE49-F238E27FC236}">
+                <a16:creationId xmlns:a16="http://schemas.microsoft.com/office/drawing/2014/main" id="{CC3D5653-29ED-0A18-782A-3F77F3BCCC8C}"/>
+              </a:ext>
+            </a:extLst>
+          </p:cNvPr>
+          <p:cNvSpPr txBox="1"/>
+          <p:nvPr/>
+        </p:nvSpPr>
+        <p:spPr>
+          <a:xfrm>
+            <a:off x="6298223" y="2376166"/>
+            <a:ext cx="5791200" cy="3231654"/>
+          </a:xfrm>
+          <a:prstGeom prst="rect">
+            <a:avLst/>
+          </a:prstGeom>
+          <a:noFill/>
+        </p:spPr>
+        <p:txBody>
+          <a:bodyPr wrap="square" rtlCol="0">
+            <a:spAutoFit/>
+          </a:bodyPr>
+          <a:lstStyle/>
+          <a:p>
+            <a:pPr marL="285750" indent="-285750">
+              <a:buFont typeface="Courier New" panose="02070309020205020404" pitchFamily="49" charset="0"/>
+              <a:buChar char="o"/>
+            </a:pPr>
+            <a:r>
+              <a:rPr lang="pt-BR" sz="2800" dirty="0"/>
+              <a:t>Escala Vertical (Baixa Escalabilidade);</a:t>
+            </a:r>
+          </a:p>
+          <a:p>
+            <a:pPr marL="285750" indent="-285750">
+              <a:buFont typeface="Courier New" panose="02070309020205020404" pitchFamily="49" charset="0"/>
+              <a:buChar char="o"/>
+            </a:pPr>
+            <a:r>
+              <a:rPr lang="pt-BR" sz="2800" dirty="0"/>
+              <a:t>Esquema Rígido (Pouca Flexibilidade);</a:t>
+            </a:r>
+          </a:p>
+          <a:p>
+            <a:pPr marL="285750" indent="-285750">
+              <a:buFont typeface="Courier New" panose="02070309020205020404" pitchFamily="49" charset="0"/>
+              <a:buChar char="o"/>
+            </a:pPr>
+            <a:r>
+              <a:rPr lang="pt-BR" sz="2800" dirty="0"/>
+              <a:t>Menor Desempenho em cenários Big Data – Exemplo do Post do Instagram.</a:t>
+            </a:r>
+          </a:p>
+          <a:p>
+            <a:pPr marL="285750" indent="-285750">
+              <a:buFont typeface="Courier New" panose="02070309020205020404" pitchFamily="49" charset="0"/>
+              <a:buChar char="o"/>
+            </a:pPr>
             <a:endParaRPr lang="pt-BR" dirty="0"/>
+          </a:p>
+          <a:p>
+            <a:pPr marL="285750" indent="-285750">
+              <a:buFont typeface="Courier New" panose="02070309020205020404" pitchFamily="49" charset="0"/>
+              <a:buChar char="o"/>
+            </a:pPr>
+            <a:endParaRPr lang="pt-BR" dirty="0"/>
+          </a:p>
+        </p:txBody>
+      </p:sp>
+      <p:sp>
+        <p:nvSpPr>
+          <p:cNvPr id="4" name="CaixaDeTexto 3">
+            <a:extLst>
+              <a:ext uri="{FF2B5EF4-FFF2-40B4-BE49-F238E27FC236}">
+                <a16:creationId xmlns:a16="http://schemas.microsoft.com/office/drawing/2014/main" id="{66DCDE54-8572-CFFE-0B75-05525B32A744}"/>
+              </a:ext>
+            </a:extLst>
+          </p:cNvPr>
+          <p:cNvSpPr txBox="1"/>
+          <p:nvPr/>
+        </p:nvSpPr>
+        <p:spPr>
+          <a:xfrm>
+            <a:off x="1085850" y="2376166"/>
+            <a:ext cx="4598376" cy="2523768"/>
+          </a:xfrm>
+          <a:prstGeom prst="rect">
+            <a:avLst/>
+          </a:prstGeom>
+          <a:noFill/>
+        </p:spPr>
+        <p:txBody>
+          <a:bodyPr wrap="square" rtlCol="0">
+            <a:spAutoFit/>
+          </a:bodyPr>
+          <a:lstStyle/>
+          <a:p>
+            <a:endParaRPr lang="pt-BR" dirty="0"/>
+          </a:p>
+          <a:p>
+            <a:pPr marL="285750" indent="-285750">
+              <a:buFont typeface="Courier New" panose="02070309020205020404" pitchFamily="49" charset="0"/>
+              <a:buChar char="o"/>
+            </a:pPr>
+            <a:r>
+              <a:rPr lang="pt-BR" sz="2800" dirty="0"/>
+              <a:t>Garantia </a:t>
+            </a:r>
+            <a:r>
+              <a:rPr lang="pt-BR" sz="2800" b="1" dirty="0"/>
+              <a:t>ACID</a:t>
+            </a:r>
+            <a:r>
+              <a:rPr lang="pt-BR" sz="2800" dirty="0"/>
+              <a:t> – Segurança e Consistência;</a:t>
+            </a:r>
+          </a:p>
+          <a:p>
+            <a:pPr marL="285750" indent="-285750">
+              <a:buFont typeface="Courier New" panose="02070309020205020404" pitchFamily="49" charset="0"/>
+              <a:buChar char="o"/>
+            </a:pPr>
+            <a:r>
+              <a:rPr lang="pt-BR" sz="2800" dirty="0"/>
+              <a:t>Sistema Robusto de consultas;</a:t>
+            </a:r>
+          </a:p>
+          <a:p>
+            <a:pPr marL="285750" indent="-285750">
+              <a:buFont typeface="Courier New" panose="02070309020205020404" pitchFamily="49" charset="0"/>
+              <a:buChar char="o"/>
+            </a:pPr>
+            <a:r>
+              <a:rPr lang="pt-BR" sz="2800" dirty="0"/>
+              <a:t>Padronização – Estabilidade.</a:t>
+            </a:r>
           </a:p>
         </p:txBody>
       </p:sp>
     </p:spTree>
     <p:extLst>
       <p:ext uri="{BB962C8B-B14F-4D97-AF65-F5344CB8AC3E}">
-        <p14:creationId xmlns:p14="http://schemas.microsoft.com/office/powerpoint/2010/main" val="2403749975"/>
+        <p14:creationId xmlns:p14="http://schemas.microsoft.com/office/powerpoint/2010/main" val="804502514"/>
       </p:ext>
     </p:extLst>
   </p:cSld>
@@ -4357,7 +4708,7 @@
           <p:cNvPr id="2" name="Título 1">
             <a:extLst>
               <a:ext uri="{FF2B5EF4-FFF2-40B4-BE49-F238E27FC236}">
-                <a16:creationId xmlns:a16="http://schemas.microsoft.com/office/drawing/2014/main" id="{7F19C2AA-FBF7-903E-653B-05FE47F3B3B8}"/>
+                <a16:creationId xmlns:a16="http://schemas.microsoft.com/office/drawing/2014/main" id="{3E24A81F-FB2A-8C0A-B028-8D100530BE72}"/>
               </a:ext>
             </a:extLst>
           </p:cNvPr>
@@ -4382,7 +4733,7 @@
           <p:cNvPr id="3" name="Espaço Reservado para Conteúdo 2">
             <a:extLst>
               <a:ext uri="{FF2B5EF4-FFF2-40B4-BE49-F238E27FC236}">
-                <a16:creationId xmlns:a16="http://schemas.microsoft.com/office/drawing/2014/main" id="{B11F1969-1A42-4671-CC35-05FD6D1F97CB}"/>
+                <a16:creationId xmlns:a16="http://schemas.microsoft.com/office/drawing/2014/main" id="{130A59D2-3DFC-7F99-AA0D-6A9D525F4C43}"/>
               </a:ext>
             </a:extLst>
           </p:cNvPr>
@@ -4407,7 +4758,7 @@
           <p:cNvPr id="4" name="Imagem 3">
             <a:extLst>
               <a:ext uri="{FF2B5EF4-FFF2-40B4-BE49-F238E27FC236}">
-                <a16:creationId xmlns:a16="http://schemas.microsoft.com/office/drawing/2014/main" id="{DC8E56B4-1CFF-90BC-F549-2E951581875F}"/>
+                <a16:creationId xmlns:a16="http://schemas.microsoft.com/office/drawing/2014/main" id="{34E96833-C58D-A904-75A9-1A3FBBAEBED3}"/>
               </a:ext>
             </a:extLst>
           </p:cNvPr>
@@ -4430,7 +4781,7 @@
         </p:blipFill>
         <p:spPr>
           <a:xfrm>
-            <a:off x="0" y="0"/>
+            <a:off x="0" y="-1"/>
             <a:ext cx="12192000" cy="6858000"/>
           </a:xfrm>
           <a:prstGeom prst="rect">
@@ -4443,7 +4794,7 @@
           <p:cNvPr id="5" name="CaixaDeTexto 4">
             <a:extLst>
               <a:ext uri="{FF2B5EF4-FFF2-40B4-BE49-F238E27FC236}">
-                <a16:creationId xmlns:a16="http://schemas.microsoft.com/office/drawing/2014/main" id="{07C9C99E-86FD-270E-78CA-F920A1860433}"/>
+                <a16:creationId xmlns:a16="http://schemas.microsoft.com/office/drawing/2014/main" id="{9B183E33-21E7-CBCA-C10C-9C7F7F4252F7}"/>
               </a:ext>
             </a:extLst>
           </p:cNvPr>
@@ -4452,8 +4803,8 @@
         </p:nvSpPr>
         <p:spPr>
           <a:xfrm>
-            <a:off x="4226902" y="625296"/>
-            <a:ext cx="3738196" cy="1200329"/>
+            <a:off x="5361784" y="507245"/>
+            <a:ext cx="1679332" cy="646331"/>
           </a:xfrm>
           <a:prstGeom prst="rect">
             <a:avLst/>
@@ -4466,218 +4817,138 @@
           </a:bodyPr>
           <a:lstStyle/>
           <a:p>
-            <a:pPr algn="ctr"/>
-            <a:r>
-              <a:rPr lang="en-US" sz="3600" dirty="0" err="1"/>
-              <a:t>Tipos</a:t>
-            </a:r>
             <a:r>
               <a:rPr lang="en-US" sz="3600" dirty="0"/>
-              <a:t> de Dados </a:t>
-            </a:r>
-            <a:r>
-              <a:rPr lang="en-US" sz="3600" dirty="0" err="1"/>
-              <a:t>mais</a:t>
-            </a:r>
-            <a:r>
-              <a:rPr lang="en-US" sz="3600" dirty="0"/>
-              <a:t> </a:t>
-            </a:r>
-            <a:r>
-              <a:rPr lang="en-US" sz="3600" dirty="0" err="1"/>
-              <a:t>Utilizados</a:t>
+              <a:t>Tabelas</a:t>
             </a:r>
             <a:endParaRPr lang="pt-BR" sz="3600" dirty="0"/>
           </a:p>
         </p:txBody>
       </p:sp>
-      <p:sp>
-        <p:nvSpPr>
-          <p:cNvPr id="6" name="CaixaDeTexto 5">
-            <a:extLst>
-              <a:ext uri="{FF2B5EF4-FFF2-40B4-BE49-F238E27FC236}">
-                <a16:creationId xmlns:a16="http://schemas.microsoft.com/office/drawing/2014/main" id="{CF5DB712-4B36-E46B-B72F-EC5B1251A957}"/>
-              </a:ext>
-            </a:extLst>
-          </p:cNvPr>
-          <p:cNvSpPr txBox="1"/>
+      <p:pic>
+        <p:nvPicPr>
+          <p:cNvPr id="7" name="Imagem 6">
+            <a:extLst>
+              <a:ext uri="{FF2B5EF4-FFF2-40B4-BE49-F238E27FC236}">
+                <a16:creationId xmlns:a16="http://schemas.microsoft.com/office/drawing/2014/main" id="{F7A7230C-3228-D2F1-D70B-D45A7FAEE926}"/>
+              </a:ext>
+            </a:extLst>
+          </p:cNvPr>
+          <p:cNvPicPr>
+            <a:picLocks noChangeAspect="1"/>
+          </p:cNvPicPr>
           <p:nvPr/>
-        </p:nvSpPr>
-        <p:spPr>
-          <a:xfrm>
-            <a:off x="668213" y="2149019"/>
-            <a:ext cx="1890347" cy="1754326"/>
+        </p:nvPicPr>
+        <p:blipFill>
+          <a:blip r:embed="rId3"/>
+          <a:stretch>
+            <a:fillRect/>
+          </a:stretch>
+        </p:blipFill>
+        <p:spPr>
+          <a:xfrm>
+            <a:off x="938771" y="2350851"/>
+            <a:ext cx="1952898" cy="2276793"/>
           </a:xfrm>
           <a:prstGeom prst="rect">
             <a:avLst/>
           </a:prstGeom>
-        </p:spPr>
-        <p:style>
-          <a:lnRef idx="0">
-            <a:schemeClr val="accent6"/>
-          </a:lnRef>
-          <a:fillRef idx="3">
-            <a:schemeClr val="accent6"/>
-          </a:fillRef>
-          <a:effectRef idx="3">
-            <a:schemeClr val="accent6"/>
-          </a:effectRef>
-          <a:fontRef idx="minor">
-            <a:schemeClr val="lt1"/>
-          </a:fontRef>
-        </p:style>
-        <p:txBody>
-          <a:bodyPr wrap="square" rtlCol="0">
-            <a:spAutoFit/>
-          </a:bodyPr>
-          <a:lstStyle/>
-          <a:p>
-            <a:r>
-              <a:rPr lang="en-US" dirty="0"/>
-              <a:t>Numéricos</a:t>
-            </a:r>
-          </a:p>
-          <a:p>
-            <a:endParaRPr lang="en-US" dirty="0"/>
-          </a:p>
-          <a:p>
-            <a:pPr marL="285750" indent="-285750">
-              <a:buFont typeface="Arial" panose="020B0604020202020204" pitchFamily="34" charset="0"/>
-              <a:buChar char="•"/>
-            </a:pPr>
-            <a:r>
-              <a:rPr lang="en-US" dirty="0"/>
-              <a:t>INTEGER(INT);</a:t>
-            </a:r>
-          </a:p>
-          <a:p>
-            <a:pPr marL="285750" indent="-285750">
-              <a:buFont typeface="Arial" panose="020B0604020202020204" pitchFamily="34" charset="0"/>
-              <a:buChar char="•"/>
-            </a:pPr>
-            <a:r>
-              <a:rPr lang="en-US" dirty="0"/>
-              <a:t>DECIMAL(</a:t>
-            </a:r>
-            <a:r>
-              <a:rPr lang="en-US" dirty="0" err="1"/>
-              <a:t>i,j</a:t>
-            </a:r>
-            <a:r>
-              <a:rPr lang="en-US" dirty="0"/>
-              <a:t>);</a:t>
-            </a:r>
-          </a:p>
-          <a:p>
-            <a:pPr marL="285750" indent="-285750">
-              <a:buFont typeface="Arial" panose="020B0604020202020204" pitchFamily="34" charset="0"/>
-              <a:buChar char="•"/>
-            </a:pPr>
-            <a:r>
-              <a:rPr lang="pt-BR" dirty="0"/>
-              <a:t>FLOAT(j);</a:t>
-            </a:r>
-          </a:p>
-          <a:p>
-            <a:pPr marL="285750" indent="-285750">
-              <a:buFont typeface="Arial" panose="020B0604020202020204" pitchFamily="34" charset="0"/>
-              <a:buChar char="•"/>
-            </a:pPr>
-            <a:r>
-              <a:rPr lang="pt-BR" dirty="0"/>
-              <a:t>DOUBLE.</a:t>
-            </a:r>
-          </a:p>
-        </p:txBody>
-      </p:sp>
-      <p:sp>
-        <p:nvSpPr>
-          <p:cNvPr id="7" name="CaixaDeTexto 6">
-            <a:extLst>
-              <a:ext uri="{FF2B5EF4-FFF2-40B4-BE49-F238E27FC236}">
-                <a16:creationId xmlns:a16="http://schemas.microsoft.com/office/drawing/2014/main" id="{8DE7E38E-3494-6408-7350-6ECF0D1C611F}"/>
-              </a:ext>
-            </a:extLst>
-          </p:cNvPr>
-          <p:cNvSpPr txBox="1"/>
+          <a:ln>
+            <a:noFill/>
+          </a:ln>
+          <a:effectLst>
+            <a:softEdge rad="112500"/>
+          </a:effectLst>
+        </p:spPr>
+      </p:pic>
+      <p:pic>
+        <p:nvPicPr>
+          <p:cNvPr id="9" name="Imagem 8">
+            <a:extLst>
+              <a:ext uri="{FF2B5EF4-FFF2-40B4-BE49-F238E27FC236}">
+                <a16:creationId xmlns:a16="http://schemas.microsoft.com/office/drawing/2014/main" id="{819C0B14-793A-F183-C623-67F4538F60E0}"/>
+              </a:ext>
+            </a:extLst>
+          </p:cNvPr>
+          <p:cNvPicPr>
+            <a:picLocks noChangeAspect="1"/>
+          </p:cNvPicPr>
           <p:nvPr/>
-        </p:nvSpPr>
-        <p:spPr>
-          <a:xfrm>
-            <a:off x="668213" y="4432211"/>
-            <a:ext cx="1890347" cy="1477328"/>
+        </p:nvPicPr>
+        <p:blipFill>
+          <a:blip r:embed="rId4"/>
+          <a:stretch>
+            <a:fillRect/>
+          </a:stretch>
+        </p:blipFill>
+        <p:spPr>
+          <a:xfrm>
+            <a:off x="6201450" y="2523392"/>
+            <a:ext cx="5323292" cy="2040968"/>
           </a:xfrm>
           <a:prstGeom prst="rect">
             <a:avLst/>
           </a:prstGeom>
+          <a:ln>
+            <a:noFill/>
+          </a:ln>
+          <a:effectLst>
+            <a:outerShdw blurRad="292100" dist="139700" dir="2700000" algn="tl" rotWithShape="0">
+              <a:srgbClr val="333333">
+                <a:alpha val="65000"/>
+              </a:srgbClr>
+            </a:outerShdw>
+          </a:effectLst>
+        </p:spPr>
+      </p:pic>
+      <p:cxnSp>
+        <p:nvCxnSpPr>
+          <p:cNvPr id="11" name="Conector de Seta Reta 10">
+            <a:extLst>
+              <a:ext uri="{FF2B5EF4-FFF2-40B4-BE49-F238E27FC236}">
+                <a16:creationId xmlns:a16="http://schemas.microsoft.com/office/drawing/2014/main" id="{B5A1F8F2-3D47-AFBA-07AB-CC6C2B6C6107}"/>
+              </a:ext>
+            </a:extLst>
+          </p:cNvPr>
+          <p:cNvCxnSpPr>
+            <a:cxnSpLocks/>
+          </p:cNvCxnSpPr>
+          <p:nvPr/>
+        </p:nvCxnSpPr>
+        <p:spPr>
+          <a:xfrm>
+            <a:off x="3226777" y="3443547"/>
+            <a:ext cx="2461846" cy="0"/>
+          </a:xfrm>
+          <a:prstGeom prst="straightConnector1">
+            <a:avLst/>
+          </a:prstGeom>
+          <a:ln>
+            <a:headEnd type="triangle"/>
+            <a:tailEnd type="triangle"/>
+          </a:ln>
         </p:spPr>
         <p:style>
-          <a:lnRef idx="0">
-            <a:schemeClr val="accent6"/>
+          <a:lnRef idx="1">
+            <a:schemeClr val="dk1"/>
           </a:lnRef>
-          <a:fillRef idx="3">
-            <a:schemeClr val="accent6"/>
+          <a:fillRef idx="0">
+            <a:schemeClr val="dk1"/>
           </a:fillRef>
-          <a:effectRef idx="3">
-            <a:schemeClr val="accent6"/>
+          <a:effectRef idx="0">
+            <a:schemeClr val="dk1"/>
           </a:effectRef>
           <a:fontRef idx="minor">
-            <a:schemeClr val="lt1"/>
+            <a:schemeClr val="tx1"/>
           </a:fontRef>
         </p:style>
-        <p:txBody>
-          <a:bodyPr wrap="square" rtlCol="0">
-            <a:spAutoFit/>
-          </a:bodyPr>
-          <a:lstStyle/>
-          <a:p>
-            <a:r>
-              <a:rPr lang="en-US" dirty="0"/>
-              <a:t>String</a:t>
-            </a:r>
-          </a:p>
-          <a:p>
-            <a:endParaRPr lang="en-US" dirty="0"/>
-          </a:p>
-          <a:p>
-            <a:pPr marL="285750" indent="-285750">
-              <a:buFont typeface="Arial" panose="020B0604020202020204" pitchFamily="34" charset="0"/>
-              <a:buChar char="•"/>
-            </a:pPr>
-            <a:r>
-              <a:rPr lang="en-US" dirty="0"/>
-              <a:t>CHAR(n);</a:t>
-            </a:r>
-          </a:p>
-          <a:p>
-            <a:pPr marL="285750" indent="-285750">
-              <a:buFont typeface="Arial" panose="020B0604020202020204" pitchFamily="34" charset="0"/>
-              <a:buChar char="•"/>
-            </a:pPr>
-            <a:r>
-              <a:rPr lang="en-US" dirty="0"/>
-              <a:t>VARCHAR(n);</a:t>
-            </a:r>
-          </a:p>
-          <a:p>
-            <a:pPr marL="285750" indent="-285750">
-              <a:buFont typeface="Arial" panose="020B0604020202020204" pitchFamily="34" charset="0"/>
-              <a:buChar char="•"/>
-            </a:pPr>
-            <a:r>
-              <a:rPr lang="en-US" dirty="0"/>
-              <a:t>TEXT.</a:t>
-            </a:r>
-            <a:endParaRPr lang="pt-BR" dirty="0"/>
-          </a:p>
-        </p:txBody>
-      </p:sp>
-      <p:sp>
-        <p:nvSpPr>
-          <p:cNvPr id="8" name="CaixaDeTexto 7">
-            <a:extLst>
-              <a:ext uri="{FF2B5EF4-FFF2-40B4-BE49-F238E27FC236}">
-                <a16:creationId xmlns:a16="http://schemas.microsoft.com/office/drawing/2014/main" id="{55D6A370-6461-1F31-4384-B06A74A36017}"/>
+      </p:cxnSp>
+      <p:sp>
+        <p:nvSpPr>
+          <p:cNvPr id="12" name="CaixaDeTexto 11">
+            <a:extLst>
+              <a:ext uri="{FF2B5EF4-FFF2-40B4-BE49-F238E27FC236}">
+                <a16:creationId xmlns:a16="http://schemas.microsoft.com/office/drawing/2014/main" id="{51F69BD2-7A79-07E2-2082-7D0BE7DD3F87}"/>
               </a:ext>
             </a:extLst>
           </p:cNvPr>
@@ -4686,79 +4957,8 @@
         </p:nvSpPr>
         <p:spPr>
           <a:xfrm>
-            <a:off x="6655044" y="2149019"/>
-            <a:ext cx="1310054" cy="1200329"/>
-          </a:xfrm>
-          <a:prstGeom prst="rect">
-            <a:avLst/>
-          </a:prstGeom>
-        </p:spPr>
-        <p:style>
-          <a:lnRef idx="0">
-            <a:schemeClr val="accent6"/>
-          </a:lnRef>
-          <a:fillRef idx="3">
-            <a:schemeClr val="accent6"/>
-          </a:fillRef>
-          <a:effectRef idx="3">
-            <a:schemeClr val="accent6"/>
-          </a:effectRef>
-          <a:fontRef idx="minor">
-            <a:schemeClr val="lt1"/>
-          </a:fontRef>
-        </p:style>
-        <p:txBody>
-          <a:bodyPr wrap="square" rtlCol="0">
-            <a:spAutoFit/>
-          </a:bodyPr>
-          <a:lstStyle/>
-          <a:p>
-            <a:r>
-              <a:rPr lang="en-US" dirty="0"/>
-              <a:t>Data e Hora</a:t>
-            </a:r>
-          </a:p>
-          <a:p>
-            <a:endParaRPr lang="en-US" dirty="0"/>
-          </a:p>
-          <a:p>
-            <a:pPr marL="285750" indent="-285750">
-              <a:buFont typeface="Arial" panose="020B0604020202020204" pitchFamily="34" charset="0"/>
-              <a:buChar char="•"/>
-            </a:pPr>
-            <a:r>
-              <a:rPr lang="en-US" dirty="0"/>
-              <a:t>DATE;</a:t>
-            </a:r>
-          </a:p>
-          <a:p>
-            <a:pPr marL="285750" indent="-285750">
-              <a:buFont typeface="Arial" panose="020B0604020202020204" pitchFamily="34" charset="0"/>
-              <a:buChar char="•"/>
-            </a:pPr>
-            <a:r>
-              <a:rPr lang="en-US" dirty="0"/>
-              <a:t>TIME;</a:t>
-            </a:r>
-          </a:p>
-        </p:txBody>
-      </p:sp>
-      <p:sp>
-        <p:nvSpPr>
-          <p:cNvPr id="9" name="CaixaDeTexto 8">
-            <a:extLst>
-              <a:ext uri="{FF2B5EF4-FFF2-40B4-BE49-F238E27FC236}">
-                <a16:creationId xmlns:a16="http://schemas.microsoft.com/office/drawing/2014/main" id="{ECA0C54F-A8DD-7C4C-6D28-8AC3ADD6AE9D}"/>
-              </a:ext>
-            </a:extLst>
-          </p:cNvPr>
-          <p:cNvSpPr txBox="1"/>
-          <p:nvPr/>
-        </p:nvSpPr>
-        <p:spPr>
-          <a:xfrm>
-            <a:off x="2817931" y="2703017"/>
-            <a:ext cx="1925517" cy="646331"/>
+            <a:off x="1231115" y="4627644"/>
+            <a:ext cx="1368209" cy="646331"/>
           </a:xfrm>
           <a:prstGeom prst="rect">
             <a:avLst/>
@@ -4771,58 +4971,20 @@
           </a:bodyPr>
           <a:lstStyle/>
           <a:p>
-            <a:pPr algn="just"/>
             <a:r>
               <a:rPr lang="en-US" dirty="0"/>
-              <a:t>i: </a:t>
-            </a:r>
-            <a:r>
-              <a:rPr lang="en-US" dirty="0" err="1"/>
-              <a:t>dígitos</a:t>
-            </a:r>
-            <a:r>
-              <a:rPr lang="en-US" dirty="0"/>
-              <a:t> </a:t>
-            </a:r>
-            <a:r>
-              <a:rPr lang="en-US" dirty="0" err="1"/>
-              <a:t>totais</a:t>
-            </a:r>
-            <a:r>
-              <a:rPr lang="en-US" dirty="0"/>
-              <a:t>;</a:t>
-            </a:r>
-          </a:p>
-          <a:p>
-            <a:r>
-              <a:rPr lang="en-US" dirty="0"/>
-              <a:t>j: </a:t>
-            </a:r>
-            <a:r>
-              <a:rPr lang="en-US" dirty="0" err="1"/>
-              <a:t>dígitos</a:t>
-            </a:r>
-            <a:r>
-              <a:rPr lang="en-US" dirty="0"/>
-              <a:t> </a:t>
-            </a:r>
-            <a:r>
-              <a:rPr lang="en-US" dirty="0" err="1"/>
-              <a:t>decimais</a:t>
-            </a:r>
-            <a:r>
-              <a:rPr lang="en-US" dirty="0"/>
-              <a:t>.</a:t>
-            </a:r>
-          </a:p>
-        </p:txBody>
-      </p:sp>
-      <p:sp>
-        <p:nvSpPr>
-          <p:cNvPr id="10" name="CaixaDeTexto 9">
-            <a:extLst>
-              <a:ext uri="{FF2B5EF4-FFF2-40B4-BE49-F238E27FC236}">
-                <a16:creationId xmlns:a16="http://schemas.microsoft.com/office/drawing/2014/main" id="{8160FF93-9C48-8D4D-E000-96C7BC087CFE}"/>
+              <a:t>Modelo do Workbench</a:t>
+            </a:r>
+            <a:endParaRPr lang="pt-BR" dirty="0"/>
+          </a:p>
+        </p:txBody>
+      </p:sp>
+      <p:sp>
+        <p:nvSpPr>
+          <p:cNvPr id="13" name="CaixaDeTexto 12">
+            <a:extLst>
+              <a:ext uri="{FF2B5EF4-FFF2-40B4-BE49-F238E27FC236}">
+                <a16:creationId xmlns:a16="http://schemas.microsoft.com/office/drawing/2014/main" id="{56579E6D-0B72-D7FC-6459-168E6428A857}"/>
               </a:ext>
             </a:extLst>
           </p:cNvPr>
@@ -4831,8 +4993,8 @@
         </p:nvSpPr>
         <p:spPr>
           <a:xfrm>
-            <a:off x="3059722" y="4709210"/>
-            <a:ext cx="8115301" cy="923330"/>
+            <a:off x="8084599" y="4892787"/>
+            <a:ext cx="1556994" cy="381188"/>
           </a:xfrm>
           <a:prstGeom prst="rect">
             <a:avLst/>
@@ -4847,241 +5009,16 @@
           <a:p>
             <a:r>
               <a:rPr lang="en-US" dirty="0"/>
-              <a:t>CHAR é FIXO em </a:t>
-            </a:r>
-            <a:r>
-              <a:rPr lang="en-US" b="1" u="sng" dirty="0"/>
-              <a:t>n </a:t>
-            </a:r>
-            <a:r>
-              <a:rPr lang="en-US" dirty="0" err="1"/>
-              <a:t>caracteres</a:t>
-            </a:r>
-            <a:r>
-              <a:rPr lang="en-US" dirty="0"/>
-              <a:t>!</a:t>
-            </a:r>
-          </a:p>
-          <a:p>
-            <a:r>
-              <a:rPr lang="en-US" dirty="0"/>
-              <a:t>VARCHAR </a:t>
-            </a:r>
-            <a:r>
-              <a:rPr lang="en-US" dirty="0" err="1"/>
-              <a:t>aceita</a:t>
-            </a:r>
-            <a:r>
-              <a:rPr lang="en-US" dirty="0"/>
-              <a:t> </a:t>
-            </a:r>
-            <a:r>
-              <a:rPr lang="en-US" b="1" u="sng" dirty="0" err="1"/>
-              <a:t>até</a:t>
-            </a:r>
-            <a:r>
-              <a:rPr lang="en-US" b="1" u="sng" dirty="0"/>
-              <a:t> n </a:t>
-            </a:r>
-            <a:r>
-              <a:rPr lang="en-US" dirty="0" err="1"/>
-              <a:t>caracteres</a:t>
-            </a:r>
-            <a:r>
-              <a:rPr lang="en-US" dirty="0"/>
-              <a:t>!</a:t>
-            </a:r>
-          </a:p>
-          <a:p>
-            <a:pPr algn="just"/>
-            <a:r>
-              <a:rPr lang="en-US" dirty="0"/>
-              <a:t>TEXT </a:t>
-            </a:r>
-            <a:r>
-              <a:rPr lang="en-US" dirty="0" err="1"/>
-              <a:t>não</a:t>
-            </a:r>
-            <a:r>
-              <a:rPr lang="en-US" dirty="0"/>
-              <a:t> </a:t>
-            </a:r>
-            <a:r>
-              <a:rPr lang="en-US" dirty="0" err="1"/>
-              <a:t>tem</a:t>
-            </a:r>
-            <a:r>
-              <a:rPr lang="en-US" dirty="0"/>
-              <a:t> </a:t>
-            </a:r>
-            <a:r>
-              <a:rPr lang="en-US" dirty="0" err="1"/>
-              <a:t>quantidade</a:t>
-            </a:r>
-            <a:r>
-              <a:rPr lang="en-US" dirty="0"/>
-              <a:t> </a:t>
-            </a:r>
-            <a:r>
-              <a:rPr lang="en-US" dirty="0" err="1"/>
-              <a:t>fixa</a:t>
-            </a:r>
-            <a:r>
-              <a:rPr lang="en-US" dirty="0"/>
-              <a:t>, é </a:t>
-            </a:r>
-            <a:r>
-              <a:rPr lang="en-US" dirty="0" err="1"/>
-              <a:t>bastante</a:t>
-            </a:r>
-            <a:r>
-              <a:rPr lang="en-US" dirty="0"/>
-              <a:t> </a:t>
-            </a:r>
-            <a:r>
-              <a:rPr lang="en-US" dirty="0" err="1"/>
-              <a:t>usado</a:t>
-            </a:r>
-            <a:r>
-              <a:rPr lang="en-US" dirty="0"/>
-              <a:t> para </a:t>
-            </a:r>
-            <a:r>
-              <a:rPr lang="en-US" dirty="0" err="1"/>
-              <a:t>textos</a:t>
-            </a:r>
-            <a:r>
-              <a:rPr lang="en-US" dirty="0"/>
-              <a:t> e </a:t>
-            </a:r>
-            <a:r>
-              <a:rPr lang="en-US" dirty="0" err="1"/>
-              <a:t>descrições</a:t>
-            </a:r>
-            <a:r>
-              <a:rPr lang="en-US" dirty="0"/>
-              <a:t> </a:t>
-            </a:r>
-            <a:r>
-              <a:rPr lang="en-US" b="1" u="sng" dirty="0" err="1"/>
-              <a:t>extensos</a:t>
-            </a:r>
-            <a:r>
-              <a:rPr lang="en-US" dirty="0"/>
-              <a:t>.</a:t>
+              <a:t>Tabela Simples</a:t>
             </a:r>
             <a:endParaRPr lang="pt-BR" dirty="0"/>
-          </a:p>
-        </p:txBody>
-      </p:sp>
-      <p:sp>
-        <p:nvSpPr>
-          <p:cNvPr id="11" name="CaixaDeTexto 10">
-            <a:extLst>
-              <a:ext uri="{FF2B5EF4-FFF2-40B4-BE49-F238E27FC236}">
-                <a16:creationId xmlns:a16="http://schemas.microsoft.com/office/drawing/2014/main" id="{BAE54747-6513-C3D7-FD53-04D4E0AB047D}"/>
-              </a:ext>
-            </a:extLst>
-          </p:cNvPr>
-          <p:cNvSpPr txBox="1"/>
-          <p:nvPr/>
-        </p:nvSpPr>
-        <p:spPr>
-          <a:xfrm>
-            <a:off x="8135085" y="2450385"/>
-            <a:ext cx="2312377" cy="646331"/>
-          </a:xfrm>
-          <a:prstGeom prst="rect">
-            <a:avLst/>
-          </a:prstGeom>
-          <a:noFill/>
-        </p:spPr>
-        <p:txBody>
-          <a:bodyPr wrap="square" rtlCol="0">
-            <a:spAutoFit/>
-          </a:bodyPr>
-          <a:lstStyle/>
-          <a:p>
-            <a:r>
-              <a:rPr lang="en-US" dirty="0"/>
-              <a:t>DATE (YYYY-MM-DD);</a:t>
-            </a:r>
-          </a:p>
-          <a:p>
-            <a:r>
-              <a:rPr lang="en-US" dirty="0"/>
-              <a:t>TIME (HH:MM:SS).</a:t>
-            </a:r>
-            <a:endParaRPr lang="pt-BR" dirty="0"/>
-          </a:p>
-        </p:txBody>
-      </p:sp>
-      <p:sp>
-        <p:nvSpPr>
-          <p:cNvPr id="12" name="CaixaDeTexto 11">
-            <a:extLst>
-              <a:ext uri="{FF2B5EF4-FFF2-40B4-BE49-F238E27FC236}">
-                <a16:creationId xmlns:a16="http://schemas.microsoft.com/office/drawing/2014/main" id="{8638EE8C-744C-0D4F-815E-F27C65E8D203}"/>
-              </a:ext>
-            </a:extLst>
-          </p:cNvPr>
-          <p:cNvSpPr txBox="1"/>
-          <p:nvPr/>
-        </p:nvSpPr>
-        <p:spPr>
-          <a:xfrm>
-            <a:off x="6655044" y="3903345"/>
-            <a:ext cx="1600200" cy="923330"/>
-          </a:xfrm>
-          <a:prstGeom prst="rect">
-            <a:avLst/>
-          </a:prstGeom>
-        </p:spPr>
-        <p:style>
-          <a:lnRef idx="0">
-            <a:schemeClr val="accent6"/>
-          </a:lnRef>
-          <a:fillRef idx="3">
-            <a:schemeClr val="accent6"/>
-          </a:fillRef>
-          <a:effectRef idx="3">
-            <a:schemeClr val="accent6"/>
-          </a:effectRef>
-          <a:fontRef idx="minor">
-            <a:schemeClr val="lt1"/>
-          </a:fontRef>
-        </p:style>
-        <p:txBody>
-          <a:bodyPr wrap="square" rtlCol="0">
-            <a:spAutoFit/>
-          </a:bodyPr>
-          <a:lstStyle/>
-          <a:p>
-            <a:r>
-              <a:rPr lang="en-US" dirty="0" err="1"/>
-              <a:t>Lógico</a:t>
-            </a:r>
-            <a:endParaRPr lang="en-US" dirty="0"/>
-          </a:p>
-          <a:p>
-            <a:endParaRPr lang="en-US" dirty="0"/>
-          </a:p>
-          <a:p>
-            <a:pPr marL="285750" indent="-285750">
-              <a:buFont typeface="Arial" panose="020B0604020202020204" pitchFamily="34" charset="0"/>
-              <a:buChar char="•"/>
-            </a:pPr>
-            <a:r>
-              <a:rPr lang="en-US" dirty="0"/>
-              <a:t>BOOLEAN.</a:t>
-            </a:r>
           </a:p>
         </p:txBody>
       </p:sp>
     </p:spTree>
     <p:extLst>
       <p:ext uri="{BB962C8B-B14F-4D97-AF65-F5344CB8AC3E}">
-        <p14:creationId xmlns:p14="http://schemas.microsoft.com/office/powerpoint/2010/main" val="3068825762"/>
+        <p14:creationId xmlns:p14="http://schemas.microsoft.com/office/powerpoint/2010/main" val="2403749975"/>
       </p:ext>
     </p:extLst>
   </p:cSld>
@@ -5113,6 +5050,762 @@
           <p:cNvPr id="2" name="Título 1">
             <a:extLst>
               <a:ext uri="{FF2B5EF4-FFF2-40B4-BE49-F238E27FC236}">
+                <a16:creationId xmlns:a16="http://schemas.microsoft.com/office/drawing/2014/main" id="{7F19C2AA-FBF7-903E-653B-05FE47F3B3B8}"/>
+              </a:ext>
+            </a:extLst>
+          </p:cNvPr>
+          <p:cNvSpPr>
+            <a:spLocks noGrp="1"/>
+          </p:cNvSpPr>
+          <p:nvPr>
+            <p:ph type="title"/>
+          </p:nvPr>
+        </p:nvSpPr>
+        <p:spPr/>
+        <p:txBody>
+          <a:bodyPr/>
+          <a:lstStyle/>
+          <a:p>
+            <a:endParaRPr lang="pt-BR"/>
+          </a:p>
+        </p:txBody>
+      </p:sp>
+      <p:sp>
+        <p:nvSpPr>
+          <p:cNvPr id="3" name="Espaço Reservado para Conteúdo 2">
+            <a:extLst>
+              <a:ext uri="{FF2B5EF4-FFF2-40B4-BE49-F238E27FC236}">
+                <a16:creationId xmlns:a16="http://schemas.microsoft.com/office/drawing/2014/main" id="{B11F1969-1A42-4671-CC35-05FD6D1F97CB}"/>
+              </a:ext>
+            </a:extLst>
+          </p:cNvPr>
+          <p:cNvSpPr>
+            <a:spLocks noGrp="1"/>
+          </p:cNvSpPr>
+          <p:nvPr>
+            <p:ph idx="1"/>
+          </p:nvPr>
+        </p:nvSpPr>
+        <p:spPr/>
+        <p:txBody>
+          <a:bodyPr/>
+          <a:lstStyle/>
+          <a:p>
+            <a:endParaRPr lang="pt-BR"/>
+          </a:p>
+        </p:txBody>
+      </p:sp>
+      <p:pic>
+        <p:nvPicPr>
+          <p:cNvPr id="4" name="Imagem 3">
+            <a:extLst>
+              <a:ext uri="{FF2B5EF4-FFF2-40B4-BE49-F238E27FC236}">
+                <a16:creationId xmlns:a16="http://schemas.microsoft.com/office/drawing/2014/main" id="{DC8E56B4-1CFF-90BC-F549-2E951581875F}"/>
+              </a:ext>
+            </a:extLst>
+          </p:cNvPr>
+          <p:cNvPicPr>
+            <a:picLocks noChangeAspect="1"/>
+          </p:cNvPicPr>
+          <p:nvPr/>
+        </p:nvPicPr>
+        <p:blipFill>
+          <a:blip r:embed="rId2">
+            <a:extLst>
+              <a:ext uri="{28A0092B-C50C-407E-A947-70E740481C1C}">
+                <a14:useLocalDpi xmlns:a14="http://schemas.microsoft.com/office/drawing/2010/main" val="0"/>
+              </a:ext>
+            </a:extLst>
+          </a:blip>
+          <a:stretch>
+            <a:fillRect/>
+          </a:stretch>
+        </p:blipFill>
+        <p:spPr>
+          <a:xfrm>
+            <a:off x="0" y="0"/>
+            <a:ext cx="12192000" cy="6858000"/>
+          </a:xfrm>
+          <a:prstGeom prst="rect">
+            <a:avLst/>
+          </a:prstGeom>
+        </p:spPr>
+      </p:pic>
+      <p:sp>
+        <p:nvSpPr>
+          <p:cNvPr id="5" name="CaixaDeTexto 4">
+            <a:extLst>
+              <a:ext uri="{FF2B5EF4-FFF2-40B4-BE49-F238E27FC236}">
+                <a16:creationId xmlns:a16="http://schemas.microsoft.com/office/drawing/2014/main" id="{07C9C99E-86FD-270E-78CA-F920A1860433}"/>
+              </a:ext>
+            </a:extLst>
+          </p:cNvPr>
+          <p:cNvSpPr txBox="1"/>
+          <p:nvPr/>
+        </p:nvSpPr>
+        <p:spPr>
+          <a:xfrm>
+            <a:off x="4226902" y="625296"/>
+            <a:ext cx="3738196" cy="1200329"/>
+          </a:xfrm>
+          <a:prstGeom prst="rect">
+            <a:avLst/>
+          </a:prstGeom>
+          <a:noFill/>
+        </p:spPr>
+        <p:txBody>
+          <a:bodyPr wrap="square" rtlCol="0">
+            <a:spAutoFit/>
+          </a:bodyPr>
+          <a:lstStyle/>
+          <a:p>
+            <a:pPr algn="ctr"/>
+            <a:r>
+              <a:rPr lang="en-US" sz="3600" dirty="0" err="1"/>
+              <a:t>Tipos</a:t>
+            </a:r>
+            <a:r>
+              <a:rPr lang="en-US" sz="3600" dirty="0"/>
+              <a:t> de Dados </a:t>
+            </a:r>
+            <a:r>
+              <a:rPr lang="en-US" sz="3600" dirty="0" err="1"/>
+              <a:t>mais</a:t>
+            </a:r>
+            <a:r>
+              <a:rPr lang="en-US" sz="3600" dirty="0"/>
+              <a:t> </a:t>
+            </a:r>
+            <a:r>
+              <a:rPr lang="en-US" sz="3600" dirty="0" err="1"/>
+              <a:t>Utilizados</a:t>
+            </a:r>
+            <a:endParaRPr lang="pt-BR" sz="3600" dirty="0"/>
+          </a:p>
+        </p:txBody>
+      </p:sp>
+      <p:sp>
+        <p:nvSpPr>
+          <p:cNvPr id="6" name="CaixaDeTexto 5">
+            <a:extLst>
+              <a:ext uri="{FF2B5EF4-FFF2-40B4-BE49-F238E27FC236}">
+                <a16:creationId xmlns:a16="http://schemas.microsoft.com/office/drawing/2014/main" id="{CF5DB712-4B36-E46B-B72F-EC5B1251A957}"/>
+              </a:ext>
+            </a:extLst>
+          </p:cNvPr>
+          <p:cNvSpPr txBox="1"/>
+          <p:nvPr/>
+        </p:nvSpPr>
+        <p:spPr>
+          <a:xfrm>
+            <a:off x="668213" y="2149019"/>
+            <a:ext cx="1890347" cy="1754326"/>
+          </a:xfrm>
+          <a:prstGeom prst="rect">
+            <a:avLst/>
+          </a:prstGeom>
+        </p:spPr>
+        <p:style>
+          <a:lnRef idx="0">
+            <a:schemeClr val="accent6"/>
+          </a:lnRef>
+          <a:fillRef idx="3">
+            <a:schemeClr val="accent6"/>
+          </a:fillRef>
+          <a:effectRef idx="3">
+            <a:schemeClr val="accent6"/>
+          </a:effectRef>
+          <a:fontRef idx="minor">
+            <a:schemeClr val="lt1"/>
+          </a:fontRef>
+        </p:style>
+        <p:txBody>
+          <a:bodyPr wrap="square" rtlCol="0">
+            <a:spAutoFit/>
+          </a:bodyPr>
+          <a:lstStyle/>
+          <a:p>
+            <a:r>
+              <a:rPr lang="en-US" dirty="0"/>
+              <a:t>Numéricos</a:t>
+            </a:r>
+          </a:p>
+          <a:p>
+            <a:endParaRPr lang="en-US" dirty="0"/>
+          </a:p>
+          <a:p>
+            <a:pPr marL="285750" indent="-285750">
+              <a:buFont typeface="Arial" panose="020B0604020202020204" pitchFamily="34" charset="0"/>
+              <a:buChar char="•"/>
+            </a:pPr>
+            <a:r>
+              <a:rPr lang="en-US" dirty="0"/>
+              <a:t>INTEGER(INT);</a:t>
+            </a:r>
+          </a:p>
+          <a:p>
+            <a:pPr marL="285750" indent="-285750">
+              <a:buFont typeface="Arial" panose="020B0604020202020204" pitchFamily="34" charset="0"/>
+              <a:buChar char="•"/>
+            </a:pPr>
+            <a:r>
+              <a:rPr lang="en-US" dirty="0"/>
+              <a:t>DECIMAL(</a:t>
+            </a:r>
+            <a:r>
+              <a:rPr lang="en-US" dirty="0" err="1"/>
+              <a:t>i,j</a:t>
+            </a:r>
+            <a:r>
+              <a:rPr lang="en-US" dirty="0"/>
+              <a:t>);</a:t>
+            </a:r>
+          </a:p>
+          <a:p>
+            <a:pPr marL="285750" indent="-285750">
+              <a:buFont typeface="Arial" panose="020B0604020202020204" pitchFamily="34" charset="0"/>
+              <a:buChar char="•"/>
+            </a:pPr>
+            <a:r>
+              <a:rPr lang="pt-BR" dirty="0"/>
+              <a:t>FLOAT(j);</a:t>
+            </a:r>
+          </a:p>
+          <a:p>
+            <a:pPr marL="285750" indent="-285750">
+              <a:buFont typeface="Arial" panose="020B0604020202020204" pitchFamily="34" charset="0"/>
+              <a:buChar char="•"/>
+            </a:pPr>
+            <a:r>
+              <a:rPr lang="pt-BR" dirty="0"/>
+              <a:t>DOUBLE.</a:t>
+            </a:r>
+          </a:p>
+        </p:txBody>
+      </p:sp>
+      <p:sp>
+        <p:nvSpPr>
+          <p:cNvPr id="7" name="CaixaDeTexto 6">
+            <a:extLst>
+              <a:ext uri="{FF2B5EF4-FFF2-40B4-BE49-F238E27FC236}">
+                <a16:creationId xmlns:a16="http://schemas.microsoft.com/office/drawing/2014/main" id="{8DE7E38E-3494-6408-7350-6ECF0D1C611F}"/>
+              </a:ext>
+            </a:extLst>
+          </p:cNvPr>
+          <p:cNvSpPr txBox="1"/>
+          <p:nvPr/>
+        </p:nvSpPr>
+        <p:spPr>
+          <a:xfrm>
+            <a:off x="668213" y="4432211"/>
+            <a:ext cx="1890347" cy="1477328"/>
+          </a:xfrm>
+          <a:prstGeom prst="rect">
+            <a:avLst/>
+          </a:prstGeom>
+        </p:spPr>
+        <p:style>
+          <a:lnRef idx="0">
+            <a:schemeClr val="accent6"/>
+          </a:lnRef>
+          <a:fillRef idx="3">
+            <a:schemeClr val="accent6"/>
+          </a:fillRef>
+          <a:effectRef idx="3">
+            <a:schemeClr val="accent6"/>
+          </a:effectRef>
+          <a:fontRef idx="minor">
+            <a:schemeClr val="lt1"/>
+          </a:fontRef>
+        </p:style>
+        <p:txBody>
+          <a:bodyPr wrap="square" rtlCol="0">
+            <a:spAutoFit/>
+          </a:bodyPr>
+          <a:lstStyle/>
+          <a:p>
+            <a:r>
+              <a:rPr lang="en-US" dirty="0"/>
+              <a:t>String</a:t>
+            </a:r>
+          </a:p>
+          <a:p>
+            <a:endParaRPr lang="en-US" dirty="0"/>
+          </a:p>
+          <a:p>
+            <a:pPr marL="285750" indent="-285750">
+              <a:buFont typeface="Arial" panose="020B0604020202020204" pitchFamily="34" charset="0"/>
+              <a:buChar char="•"/>
+            </a:pPr>
+            <a:r>
+              <a:rPr lang="en-US" dirty="0"/>
+              <a:t>CHAR(n);</a:t>
+            </a:r>
+          </a:p>
+          <a:p>
+            <a:pPr marL="285750" indent="-285750">
+              <a:buFont typeface="Arial" panose="020B0604020202020204" pitchFamily="34" charset="0"/>
+              <a:buChar char="•"/>
+            </a:pPr>
+            <a:r>
+              <a:rPr lang="en-US" dirty="0"/>
+              <a:t>VARCHAR(n);</a:t>
+            </a:r>
+          </a:p>
+          <a:p>
+            <a:pPr marL="285750" indent="-285750">
+              <a:buFont typeface="Arial" panose="020B0604020202020204" pitchFamily="34" charset="0"/>
+              <a:buChar char="•"/>
+            </a:pPr>
+            <a:r>
+              <a:rPr lang="en-US" dirty="0"/>
+              <a:t>TEXT.</a:t>
+            </a:r>
+            <a:endParaRPr lang="pt-BR" dirty="0"/>
+          </a:p>
+        </p:txBody>
+      </p:sp>
+      <p:sp>
+        <p:nvSpPr>
+          <p:cNvPr id="8" name="CaixaDeTexto 7">
+            <a:extLst>
+              <a:ext uri="{FF2B5EF4-FFF2-40B4-BE49-F238E27FC236}">
+                <a16:creationId xmlns:a16="http://schemas.microsoft.com/office/drawing/2014/main" id="{55D6A370-6461-1F31-4384-B06A74A36017}"/>
+              </a:ext>
+            </a:extLst>
+          </p:cNvPr>
+          <p:cNvSpPr txBox="1"/>
+          <p:nvPr/>
+        </p:nvSpPr>
+        <p:spPr>
+          <a:xfrm>
+            <a:off x="6655044" y="2149019"/>
+            <a:ext cx="1310054" cy="1200329"/>
+          </a:xfrm>
+          <a:prstGeom prst="rect">
+            <a:avLst/>
+          </a:prstGeom>
+        </p:spPr>
+        <p:style>
+          <a:lnRef idx="0">
+            <a:schemeClr val="accent6"/>
+          </a:lnRef>
+          <a:fillRef idx="3">
+            <a:schemeClr val="accent6"/>
+          </a:fillRef>
+          <a:effectRef idx="3">
+            <a:schemeClr val="accent6"/>
+          </a:effectRef>
+          <a:fontRef idx="minor">
+            <a:schemeClr val="lt1"/>
+          </a:fontRef>
+        </p:style>
+        <p:txBody>
+          <a:bodyPr wrap="square" rtlCol="0">
+            <a:spAutoFit/>
+          </a:bodyPr>
+          <a:lstStyle/>
+          <a:p>
+            <a:r>
+              <a:rPr lang="en-US" dirty="0"/>
+              <a:t>Data e Hora</a:t>
+            </a:r>
+          </a:p>
+          <a:p>
+            <a:endParaRPr lang="en-US" dirty="0"/>
+          </a:p>
+          <a:p>
+            <a:pPr marL="285750" indent="-285750">
+              <a:buFont typeface="Arial" panose="020B0604020202020204" pitchFamily="34" charset="0"/>
+              <a:buChar char="•"/>
+            </a:pPr>
+            <a:r>
+              <a:rPr lang="en-US" dirty="0"/>
+              <a:t>DATE;</a:t>
+            </a:r>
+          </a:p>
+          <a:p>
+            <a:pPr marL="285750" indent="-285750">
+              <a:buFont typeface="Arial" panose="020B0604020202020204" pitchFamily="34" charset="0"/>
+              <a:buChar char="•"/>
+            </a:pPr>
+            <a:r>
+              <a:rPr lang="en-US" dirty="0"/>
+              <a:t>TIME;</a:t>
+            </a:r>
+          </a:p>
+        </p:txBody>
+      </p:sp>
+      <p:sp>
+        <p:nvSpPr>
+          <p:cNvPr id="9" name="CaixaDeTexto 8">
+            <a:extLst>
+              <a:ext uri="{FF2B5EF4-FFF2-40B4-BE49-F238E27FC236}">
+                <a16:creationId xmlns:a16="http://schemas.microsoft.com/office/drawing/2014/main" id="{ECA0C54F-A8DD-7C4C-6D28-8AC3ADD6AE9D}"/>
+              </a:ext>
+            </a:extLst>
+          </p:cNvPr>
+          <p:cNvSpPr txBox="1"/>
+          <p:nvPr/>
+        </p:nvSpPr>
+        <p:spPr>
+          <a:xfrm>
+            <a:off x="2817931" y="2703017"/>
+            <a:ext cx="1925517" cy="646331"/>
+          </a:xfrm>
+          <a:prstGeom prst="rect">
+            <a:avLst/>
+          </a:prstGeom>
+          <a:noFill/>
+        </p:spPr>
+        <p:txBody>
+          <a:bodyPr wrap="square" rtlCol="0">
+            <a:spAutoFit/>
+          </a:bodyPr>
+          <a:lstStyle/>
+          <a:p>
+            <a:pPr algn="just"/>
+            <a:r>
+              <a:rPr lang="en-US" dirty="0"/>
+              <a:t>i: </a:t>
+            </a:r>
+            <a:r>
+              <a:rPr lang="en-US" dirty="0" err="1"/>
+              <a:t>dígitos</a:t>
+            </a:r>
+            <a:r>
+              <a:rPr lang="en-US" dirty="0"/>
+              <a:t> </a:t>
+            </a:r>
+            <a:r>
+              <a:rPr lang="en-US" dirty="0" err="1"/>
+              <a:t>totais</a:t>
+            </a:r>
+            <a:r>
+              <a:rPr lang="en-US" dirty="0"/>
+              <a:t>;</a:t>
+            </a:r>
+          </a:p>
+          <a:p>
+            <a:r>
+              <a:rPr lang="en-US" dirty="0"/>
+              <a:t>j: </a:t>
+            </a:r>
+            <a:r>
+              <a:rPr lang="en-US" dirty="0" err="1"/>
+              <a:t>dígitos</a:t>
+            </a:r>
+            <a:r>
+              <a:rPr lang="en-US" dirty="0"/>
+              <a:t> </a:t>
+            </a:r>
+            <a:r>
+              <a:rPr lang="en-US" dirty="0" err="1"/>
+              <a:t>decimais</a:t>
+            </a:r>
+            <a:r>
+              <a:rPr lang="en-US" dirty="0"/>
+              <a:t>.</a:t>
+            </a:r>
+          </a:p>
+        </p:txBody>
+      </p:sp>
+      <p:sp>
+        <p:nvSpPr>
+          <p:cNvPr id="10" name="CaixaDeTexto 9">
+            <a:extLst>
+              <a:ext uri="{FF2B5EF4-FFF2-40B4-BE49-F238E27FC236}">
+                <a16:creationId xmlns:a16="http://schemas.microsoft.com/office/drawing/2014/main" id="{8160FF93-9C48-8D4D-E000-96C7BC087CFE}"/>
+              </a:ext>
+            </a:extLst>
+          </p:cNvPr>
+          <p:cNvSpPr txBox="1"/>
+          <p:nvPr/>
+        </p:nvSpPr>
+        <p:spPr>
+          <a:xfrm>
+            <a:off x="3059722" y="4709210"/>
+            <a:ext cx="8115301" cy="923330"/>
+          </a:xfrm>
+          <a:prstGeom prst="rect">
+            <a:avLst/>
+          </a:prstGeom>
+          <a:noFill/>
+        </p:spPr>
+        <p:txBody>
+          <a:bodyPr wrap="square" rtlCol="0">
+            <a:spAutoFit/>
+          </a:bodyPr>
+          <a:lstStyle/>
+          <a:p>
+            <a:r>
+              <a:rPr lang="en-US" dirty="0"/>
+              <a:t>CHAR é FIXO em </a:t>
+            </a:r>
+            <a:r>
+              <a:rPr lang="en-US" b="1" u="sng" dirty="0"/>
+              <a:t>n </a:t>
+            </a:r>
+            <a:r>
+              <a:rPr lang="en-US" dirty="0" err="1"/>
+              <a:t>caracteres</a:t>
+            </a:r>
+            <a:r>
+              <a:rPr lang="en-US" dirty="0"/>
+              <a:t>!</a:t>
+            </a:r>
+          </a:p>
+          <a:p>
+            <a:r>
+              <a:rPr lang="en-US" dirty="0"/>
+              <a:t>VARCHAR </a:t>
+            </a:r>
+            <a:r>
+              <a:rPr lang="en-US" dirty="0" err="1"/>
+              <a:t>aceita</a:t>
+            </a:r>
+            <a:r>
+              <a:rPr lang="en-US" dirty="0"/>
+              <a:t> </a:t>
+            </a:r>
+            <a:r>
+              <a:rPr lang="en-US" b="1" u="sng" dirty="0" err="1"/>
+              <a:t>até</a:t>
+            </a:r>
+            <a:r>
+              <a:rPr lang="en-US" b="1" u="sng" dirty="0"/>
+              <a:t> n </a:t>
+            </a:r>
+            <a:r>
+              <a:rPr lang="en-US" dirty="0" err="1"/>
+              <a:t>caracteres</a:t>
+            </a:r>
+            <a:r>
+              <a:rPr lang="en-US" dirty="0"/>
+              <a:t>!</a:t>
+            </a:r>
+          </a:p>
+          <a:p>
+            <a:pPr algn="just"/>
+            <a:r>
+              <a:rPr lang="en-US" dirty="0"/>
+              <a:t>TEXT </a:t>
+            </a:r>
+            <a:r>
+              <a:rPr lang="en-US" dirty="0" err="1"/>
+              <a:t>não</a:t>
+            </a:r>
+            <a:r>
+              <a:rPr lang="en-US" dirty="0"/>
+              <a:t> </a:t>
+            </a:r>
+            <a:r>
+              <a:rPr lang="en-US" dirty="0" err="1"/>
+              <a:t>tem</a:t>
+            </a:r>
+            <a:r>
+              <a:rPr lang="en-US" dirty="0"/>
+              <a:t> </a:t>
+            </a:r>
+            <a:r>
+              <a:rPr lang="en-US" dirty="0" err="1"/>
+              <a:t>quantidade</a:t>
+            </a:r>
+            <a:r>
+              <a:rPr lang="en-US" dirty="0"/>
+              <a:t> </a:t>
+            </a:r>
+            <a:r>
+              <a:rPr lang="en-US" dirty="0" err="1"/>
+              <a:t>fixa</a:t>
+            </a:r>
+            <a:r>
+              <a:rPr lang="en-US" dirty="0"/>
+              <a:t>, é </a:t>
+            </a:r>
+            <a:r>
+              <a:rPr lang="en-US" dirty="0" err="1"/>
+              <a:t>bastante</a:t>
+            </a:r>
+            <a:r>
+              <a:rPr lang="en-US" dirty="0"/>
+              <a:t> </a:t>
+            </a:r>
+            <a:r>
+              <a:rPr lang="en-US" dirty="0" err="1"/>
+              <a:t>usado</a:t>
+            </a:r>
+            <a:r>
+              <a:rPr lang="en-US" dirty="0"/>
+              <a:t> para </a:t>
+            </a:r>
+            <a:r>
+              <a:rPr lang="en-US" dirty="0" err="1"/>
+              <a:t>textos</a:t>
+            </a:r>
+            <a:r>
+              <a:rPr lang="en-US" dirty="0"/>
+              <a:t> e </a:t>
+            </a:r>
+            <a:r>
+              <a:rPr lang="en-US" dirty="0" err="1"/>
+              <a:t>descrições</a:t>
+            </a:r>
+            <a:r>
+              <a:rPr lang="en-US" dirty="0"/>
+              <a:t> </a:t>
+            </a:r>
+            <a:r>
+              <a:rPr lang="en-US" b="1" u="sng" dirty="0" err="1"/>
+              <a:t>extensos</a:t>
+            </a:r>
+            <a:r>
+              <a:rPr lang="en-US" dirty="0"/>
+              <a:t>.</a:t>
+            </a:r>
+            <a:endParaRPr lang="pt-BR" dirty="0"/>
+          </a:p>
+        </p:txBody>
+      </p:sp>
+      <p:sp>
+        <p:nvSpPr>
+          <p:cNvPr id="11" name="CaixaDeTexto 10">
+            <a:extLst>
+              <a:ext uri="{FF2B5EF4-FFF2-40B4-BE49-F238E27FC236}">
+                <a16:creationId xmlns:a16="http://schemas.microsoft.com/office/drawing/2014/main" id="{BAE54747-6513-C3D7-FD53-04D4E0AB047D}"/>
+              </a:ext>
+            </a:extLst>
+          </p:cNvPr>
+          <p:cNvSpPr txBox="1"/>
+          <p:nvPr/>
+        </p:nvSpPr>
+        <p:spPr>
+          <a:xfrm>
+            <a:off x="8135085" y="2450385"/>
+            <a:ext cx="2312377" cy="646331"/>
+          </a:xfrm>
+          <a:prstGeom prst="rect">
+            <a:avLst/>
+          </a:prstGeom>
+          <a:noFill/>
+        </p:spPr>
+        <p:txBody>
+          <a:bodyPr wrap="square" rtlCol="0">
+            <a:spAutoFit/>
+          </a:bodyPr>
+          <a:lstStyle/>
+          <a:p>
+            <a:r>
+              <a:rPr lang="en-US" dirty="0"/>
+              <a:t>DATE (YYYY-MM-DD);</a:t>
+            </a:r>
+          </a:p>
+          <a:p>
+            <a:r>
+              <a:rPr lang="en-US" dirty="0"/>
+              <a:t>TIME (HH:MM:SS).</a:t>
+            </a:r>
+            <a:endParaRPr lang="pt-BR" dirty="0"/>
+          </a:p>
+        </p:txBody>
+      </p:sp>
+      <p:sp>
+        <p:nvSpPr>
+          <p:cNvPr id="12" name="CaixaDeTexto 11">
+            <a:extLst>
+              <a:ext uri="{FF2B5EF4-FFF2-40B4-BE49-F238E27FC236}">
+                <a16:creationId xmlns:a16="http://schemas.microsoft.com/office/drawing/2014/main" id="{8638EE8C-744C-0D4F-815E-F27C65E8D203}"/>
+              </a:ext>
+            </a:extLst>
+          </p:cNvPr>
+          <p:cNvSpPr txBox="1"/>
+          <p:nvPr/>
+        </p:nvSpPr>
+        <p:spPr>
+          <a:xfrm>
+            <a:off x="6655044" y="3903345"/>
+            <a:ext cx="1600200" cy="923330"/>
+          </a:xfrm>
+          <a:prstGeom prst="rect">
+            <a:avLst/>
+          </a:prstGeom>
+        </p:spPr>
+        <p:style>
+          <a:lnRef idx="0">
+            <a:schemeClr val="accent6"/>
+          </a:lnRef>
+          <a:fillRef idx="3">
+            <a:schemeClr val="accent6"/>
+          </a:fillRef>
+          <a:effectRef idx="3">
+            <a:schemeClr val="accent6"/>
+          </a:effectRef>
+          <a:fontRef idx="minor">
+            <a:schemeClr val="lt1"/>
+          </a:fontRef>
+        </p:style>
+        <p:txBody>
+          <a:bodyPr wrap="square" rtlCol="0">
+            <a:spAutoFit/>
+          </a:bodyPr>
+          <a:lstStyle/>
+          <a:p>
+            <a:r>
+              <a:rPr lang="en-US" dirty="0" err="1"/>
+              <a:t>Lógico</a:t>
+            </a:r>
+            <a:endParaRPr lang="en-US" dirty="0"/>
+          </a:p>
+          <a:p>
+            <a:endParaRPr lang="en-US" dirty="0"/>
+          </a:p>
+          <a:p>
+            <a:pPr marL="285750" indent="-285750">
+              <a:buFont typeface="Arial" panose="020B0604020202020204" pitchFamily="34" charset="0"/>
+              <a:buChar char="•"/>
+            </a:pPr>
+            <a:r>
+              <a:rPr lang="en-US" dirty="0"/>
+              <a:t>BOOLEAN.</a:t>
+            </a:r>
+          </a:p>
+        </p:txBody>
+      </p:sp>
+    </p:spTree>
+    <p:extLst>
+      <p:ext uri="{BB962C8B-B14F-4D97-AF65-F5344CB8AC3E}">
+        <p14:creationId xmlns:p14="http://schemas.microsoft.com/office/powerpoint/2010/main" val="3068825762"/>
+      </p:ext>
+    </p:extLst>
+  </p:cSld>
+  <p:clrMapOvr>
+    <a:masterClrMapping/>
+  </p:clrMapOvr>
+</p:sld>
+</file>
+
+<file path=ppt/slides/slide6.xml><?xml version="1.0" encoding="utf-8"?>
+<p:sld xmlns:a="http://schemas.openxmlformats.org/drawingml/2006/main" xmlns:r="http://schemas.openxmlformats.org/officeDocument/2006/relationships" xmlns:p="http://schemas.openxmlformats.org/presentationml/2006/main">
+  <p:cSld>
+    <p:spTree>
+      <p:nvGrpSpPr>
+        <p:cNvPr id="1" name=""/>
+        <p:cNvGrpSpPr/>
+        <p:nvPr/>
+      </p:nvGrpSpPr>
+      <p:grpSpPr>
+        <a:xfrm>
+          <a:off x="0" y="0"/>
+          <a:ext cx="0" cy="0"/>
+          <a:chOff x="0" y="0"/>
+          <a:chExt cx="0" cy="0"/>
+        </a:xfrm>
+      </p:grpSpPr>
+      <p:sp>
+        <p:nvSpPr>
+          <p:cNvPr id="2" name="Título 1">
+            <a:extLst>
+              <a:ext uri="{FF2B5EF4-FFF2-40B4-BE49-F238E27FC236}">
                 <a16:creationId xmlns:a16="http://schemas.microsoft.com/office/drawing/2014/main" id="{BB064B83-BBE8-AB9C-3837-D5ABFD7899F3}"/>
               </a:ext>
             </a:extLst>
@@ -5454,7 +6147,7 @@
 </p:sld>
 </file>
 
-<file path=ppt/slides/slide6.xml><?xml version="1.0" encoding="utf-8"?>
+<file path=ppt/slides/slide7.xml><?xml version="1.0" encoding="utf-8"?>
 <p:sld xmlns:a="http://schemas.openxmlformats.org/drawingml/2006/main" xmlns:r="http://schemas.openxmlformats.org/officeDocument/2006/relationships" xmlns:p="http://schemas.openxmlformats.org/presentationml/2006/main">
   <p:cSld>
     <p:spTree>
@@ -5556,7 +6249,7 @@
 </p:sld>
 </file>
 
-<file path=ppt/slides/slide7.xml><?xml version="1.0" encoding="utf-8"?>
+<file path=ppt/slides/slide8.xml><?xml version="1.0" encoding="utf-8"?>
 <p:sld xmlns:a="http://schemas.openxmlformats.org/drawingml/2006/main" xmlns:r="http://schemas.openxmlformats.org/officeDocument/2006/relationships" xmlns:p="http://schemas.openxmlformats.org/presentationml/2006/main">
   <p:cSld>
     <p:spTree>
@@ -6068,7 +6761,7 @@
 </p:sld>
 </file>
 
-<file path=ppt/slides/slide8.xml><?xml version="1.0" encoding="utf-8"?>
+<file path=ppt/slides/slide9.xml><?xml version="1.0" encoding="utf-8"?>
 <p:sld xmlns:a="http://schemas.openxmlformats.org/drawingml/2006/main" xmlns:r="http://schemas.openxmlformats.org/officeDocument/2006/relationships" xmlns:p="http://schemas.openxmlformats.org/presentationml/2006/main">
   <p:cSld>
     <p:spTree>
@@ -6493,370 +7186,6 @@
     <p:extLst>
       <p:ext uri="{BB962C8B-B14F-4D97-AF65-F5344CB8AC3E}">
         <p14:creationId xmlns:p14="http://schemas.microsoft.com/office/powerpoint/2010/main" val="395381269"/>
-      </p:ext>
-    </p:extLst>
-  </p:cSld>
-  <p:clrMapOvr>
-    <a:masterClrMapping/>
-  </p:clrMapOvr>
-</p:sld>
-</file>
-
-<file path=ppt/slides/slide9.xml><?xml version="1.0" encoding="utf-8"?>
-<p:sld xmlns:a="http://schemas.openxmlformats.org/drawingml/2006/main" xmlns:r="http://schemas.openxmlformats.org/officeDocument/2006/relationships" xmlns:p="http://schemas.openxmlformats.org/presentationml/2006/main">
-  <p:cSld>
-    <p:spTree>
-      <p:nvGrpSpPr>
-        <p:cNvPr id="1" name="">
-          <a:extLst>
-            <a:ext uri="{FF2B5EF4-FFF2-40B4-BE49-F238E27FC236}">
-              <a16:creationId xmlns:a16="http://schemas.microsoft.com/office/drawing/2014/main" id="{5E8A27A6-8EF8-12D8-8FD8-D7F39147A30A}"/>
-            </a:ext>
-          </a:extLst>
-        </p:cNvPr>
-        <p:cNvGrpSpPr/>
-        <p:nvPr/>
-      </p:nvGrpSpPr>
-      <p:grpSpPr>
-        <a:xfrm>
-          <a:off x="0" y="0"/>
-          <a:ext cx="0" cy="0"/>
-          <a:chOff x="0" y="0"/>
-          <a:chExt cx="0" cy="0"/>
-        </a:xfrm>
-      </p:grpSpPr>
-      <p:sp>
-        <p:nvSpPr>
-          <p:cNvPr id="2" name="Título 1">
-            <a:extLst>
-              <a:ext uri="{FF2B5EF4-FFF2-40B4-BE49-F238E27FC236}">
-                <a16:creationId xmlns:a16="http://schemas.microsoft.com/office/drawing/2014/main" id="{6BF18DC9-5815-0212-B6E0-D8C10E6A492B}"/>
-              </a:ext>
-            </a:extLst>
-          </p:cNvPr>
-          <p:cNvSpPr>
-            <a:spLocks noGrp="1"/>
-          </p:cNvSpPr>
-          <p:nvPr>
-            <p:ph type="title"/>
-          </p:nvPr>
-        </p:nvSpPr>
-        <p:spPr/>
-        <p:txBody>
-          <a:bodyPr/>
-          <a:lstStyle/>
-          <a:p>
-            <a:endParaRPr lang="pt-BR"/>
-          </a:p>
-        </p:txBody>
-      </p:sp>
-      <p:sp>
-        <p:nvSpPr>
-          <p:cNvPr id="3" name="Espaço Reservado para Conteúdo 2">
-            <a:extLst>
-              <a:ext uri="{FF2B5EF4-FFF2-40B4-BE49-F238E27FC236}">
-                <a16:creationId xmlns:a16="http://schemas.microsoft.com/office/drawing/2014/main" id="{4A8E3B4E-2F8A-3689-618B-A91B245EFDE0}"/>
-              </a:ext>
-            </a:extLst>
-          </p:cNvPr>
-          <p:cNvSpPr>
-            <a:spLocks noGrp="1"/>
-          </p:cNvSpPr>
-          <p:nvPr>
-            <p:ph idx="1"/>
-          </p:nvPr>
-        </p:nvSpPr>
-        <p:spPr/>
-        <p:txBody>
-          <a:bodyPr/>
-          <a:lstStyle/>
-          <a:p>
-            <a:endParaRPr lang="pt-BR"/>
-          </a:p>
-        </p:txBody>
-      </p:sp>
-      <p:pic>
-        <p:nvPicPr>
-          <p:cNvPr id="4" name="Imagem 3">
-            <a:extLst>
-              <a:ext uri="{FF2B5EF4-FFF2-40B4-BE49-F238E27FC236}">
-                <a16:creationId xmlns:a16="http://schemas.microsoft.com/office/drawing/2014/main" id="{81421DD0-6686-3CBC-6B71-56FD159EB670}"/>
-              </a:ext>
-            </a:extLst>
-          </p:cNvPr>
-          <p:cNvPicPr>
-            <a:picLocks noChangeAspect="1"/>
-          </p:cNvPicPr>
-          <p:nvPr/>
-        </p:nvPicPr>
-        <p:blipFill>
-          <a:blip r:embed="rId2">
-            <a:extLst>
-              <a:ext uri="{28A0092B-C50C-407E-A947-70E740481C1C}">
-                <a14:useLocalDpi xmlns:a14="http://schemas.microsoft.com/office/drawing/2010/main" val="0"/>
-              </a:ext>
-            </a:extLst>
-          </a:blip>
-          <a:stretch>
-            <a:fillRect/>
-          </a:stretch>
-        </p:blipFill>
-        <p:spPr>
-          <a:xfrm>
-            <a:off x="0" y="0"/>
-            <a:ext cx="12192000" cy="6858000"/>
-          </a:xfrm>
-          <a:prstGeom prst="rect">
-            <a:avLst/>
-          </a:prstGeom>
-        </p:spPr>
-      </p:pic>
-      <p:sp>
-        <p:nvSpPr>
-          <p:cNvPr id="5" name="CaixaDeTexto 4">
-            <a:extLst>
-              <a:ext uri="{FF2B5EF4-FFF2-40B4-BE49-F238E27FC236}">
-                <a16:creationId xmlns:a16="http://schemas.microsoft.com/office/drawing/2014/main" id="{37296BF4-EF26-F538-26E9-4DC854B48CD9}"/>
-              </a:ext>
-            </a:extLst>
-          </p:cNvPr>
-          <p:cNvSpPr txBox="1"/>
-          <p:nvPr/>
-        </p:nvSpPr>
-        <p:spPr>
-          <a:xfrm>
-            <a:off x="386861" y="202223"/>
-            <a:ext cx="9064869" cy="2862322"/>
-          </a:xfrm>
-          <a:prstGeom prst="rect">
-            <a:avLst/>
-          </a:prstGeom>
-          <a:noFill/>
-        </p:spPr>
-        <p:txBody>
-          <a:bodyPr wrap="square" rtlCol="0">
-            <a:spAutoFit/>
-          </a:bodyPr>
-          <a:lstStyle/>
-          <a:p>
-            <a:r>
-              <a:rPr lang="en-US" sz="3600" dirty="0" err="1"/>
-              <a:t>Instalação</a:t>
-            </a:r>
-            <a:r>
-              <a:rPr lang="en-US" sz="3600" dirty="0"/>
-              <a:t> do MySQL Workbench</a:t>
-            </a:r>
-          </a:p>
-          <a:p>
-            <a:endParaRPr lang="en-US" sz="3600" dirty="0"/>
-          </a:p>
-          <a:p>
-            <a:pPr marL="285750" indent="-285750">
-              <a:buFont typeface="Wingdings" panose="05000000000000000000" pitchFamily="2" charset="2"/>
-              <a:buChar char="Ø"/>
-            </a:pPr>
-            <a:r>
-              <a:rPr lang="en-US" dirty="0" err="1"/>
-              <a:t>Vídeo</a:t>
-            </a:r>
-            <a:r>
-              <a:rPr lang="en-US" dirty="0"/>
-              <a:t> com </a:t>
-            </a:r>
-            <a:r>
-              <a:rPr lang="en-US" dirty="0" err="1"/>
-              <a:t>os</a:t>
-            </a:r>
-            <a:r>
-              <a:rPr lang="en-US" dirty="0"/>
-              <a:t> </a:t>
-            </a:r>
-            <a:r>
-              <a:rPr lang="en-US" dirty="0" err="1"/>
-              <a:t>detalhes</a:t>
-            </a:r>
-            <a:r>
-              <a:rPr lang="en-US" dirty="0"/>
-              <a:t> da </a:t>
-            </a:r>
-            <a:r>
-              <a:rPr lang="en-US" dirty="0" err="1"/>
-              <a:t>instalação</a:t>
-            </a:r>
-            <a:r>
-              <a:rPr lang="en-US" dirty="0"/>
-              <a:t> no canal do Teams.</a:t>
-            </a:r>
-          </a:p>
-          <a:p>
-            <a:pPr marL="285750" indent="-285750">
-              <a:buFont typeface="Wingdings" panose="05000000000000000000" pitchFamily="2" charset="2"/>
-              <a:buChar char="Ø"/>
-            </a:pPr>
-            <a:r>
-              <a:rPr lang="en-US" dirty="0" err="1"/>
-              <a:t>Arquivo</a:t>
-            </a:r>
-            <a:r>
-              <a:rPr lang="en-US" dirty="0"/>
-              <a:t> com </a:t>
-            </a:r>
-            <a:r>
-              <a:rPr lang="en-US" dirty="0" err="1"/>
-              <a:t>todos</a:t>
-            </a:r>
-            <a:r>
-              <a:rPr lang="en-US" dirty="0"/>
-              <a:t> </a:t>
-            </a:r>
-            <a:r>
-              <a:rPr lang="en-US" dirty="0" err="1"/>
-              <a:t>os</a:t>
-            </a:r>
-            <a:r>
-              <a:rPr lang="en-US" dirty="0"/>
-              <a:t> </a:t>
-            </a:r>
-            <a:r>
-              <a:rPr lang="en-US" dirty="0" err="1"/>
-              <a:t>detalhes</a:t>
-            </a:r>
-            <a:r>
-              <a:rPr lang="en-US" dirty="0"/>
-              <a:t> no TEAMS </a:t>
-            </a:r>
-            <a:r>
-              <a:rPr lang="en-US" dirty="0" err="1"/>
-              <a:t>ou</a:t>
-            </a:r>
-            <a:r>
-              <a:rPr lang="en-US" dirty="0"/>
-              <a:t> no meu </a:t>
-            </a:r>
-            <a:r>
-              <a:rPr lang="en-US" dirty="0" err="1"/>
-              <a:t>repositório</a:t>
-            </a:r>
-            <a:r>
-              <a:rPr lang="en-US" dirty="0"/>
-              <a:t> da </a:t>
-            </a:r>
-            <a:r>
-              <a:rPr lang="en-US" dirty="0" err="1"/>
-              <a:t>disciplina</a:t>
-            </a:r>
-            <a:r>
-              <a:rPr lang="en-US" dirty="0"/>
-              <a:t> no </a:t>
-            </a:r>
-            <a:r>
-              <a:rPr lang="en-US" dirty="0" err="1"/>
-              <a:t>Github</a:t>
-            </a:r>
-            <a:r>
-              <a:rPr lang="en-US" dirty="0"/>
-              <a:t>.</a:t>
-            </a:r>
-          </a:p>
-          <a:p>
-            <a:pPr marL="285750" indent="-285750">
-              <a:buFont typeface="Wingdings" panose="05000000000000000000" pitchFamily="2" charset="2"/>
-              <a:buChar char="Ø"/>
-            </a:pPr>
-            <a:r>
-              <a:rPr lang="en-US" dirty="0"/>
-              <a:t>IMPORTANTE: para </a:t>
-            </a:r>
-            <a:r>
-              <a:rPr lang="en-US" dirty="0" err="1"/>
-              <a:t>facilitar</a:t>
-            </a:r>
-            <a:r>
-              <a:rPr lang="en-US" dirty="0"/>
-              <a:t> entradas posteriores (</a:t>
-            </a:r>
-            <a:r>
-              <a:rPr lang="en-US" dirty="0" err="1"/>
-              <a:t>principalmente</a:t>
-            </a:r>
-            <a:r>
-              <a:rPr lang="en-US" dirty="0"/>
-              <a:t> no </a:t>
-            </a:r>
-            <a:r>
-              <a:rPr lang="en-US" dirty="0" err="1"/>
-              <a:t>projeto</a:t>
-            </a:r>
-            <a:r>
-              <a:rPr lang="en-US" dirty="0"/>
-              <a:t>), </a:t>
-            </a:r>
-            <a:r>
-              <a:rPr lang="en-US" dirty="0" err="1"/>
-              <a:t>recomendo</a:t>
-            </a:r>
-            <a:r>
-              <a:rPr lang="en-US" dirty="0"/>
-              <a:t> </a:t>
-            </a:r>
-            <a:r>
-              <a:rPr lang="en-US" dirty="0" err="1"/>
-              <a:t>colocar</a:t>
-            </a:r>
-            <a:r>
-              <a:rPr lang="en-US" dirty="0"/>
-              <a:t> o </a:t>
-            </a:r>
-            <a:r>
-              <a:rPr lang="en-US" b="1" u="sng" dirty="0" err="1"/>
-              <a:t>nome</a:t>
-            </a:r>
-            <a:r>
-              <a:rPr lang="en-US" b="1" u="sng" dirty="0"/>
-              <a:t> de </a:t>
-            </a:r>
-            <a:r>
-              <a:rPr lang="en-US" b="1" u="sng" dirty="0" err="1"/>
-              <a:t>usuário</a:t>
-            </a:r>
-            <a:r>
-              <a:rPr lang="en-US" b="1" u="sng" dirty="0"/>
-              <a:t> e </a:t>
-            </a:r>
-            <a:r>
-              <a:rPr lang="en-US" b="1" u="sng" dirty="0" err="1"/>
-              <a:t>senha</a:t>
-            </a:r>
-            <a:r>
-              <a:rPr lang="en-US" b="1" u="sng" dirty="0"/>
-              <a:t> </a:t>
-            </a:r>
-            <a:r>
-              <a:rPr lang="en-US" b="1" u="sng" dirty="0" err="1"/>
-              <a:t>como</a:t>
-            </a:r>
-            <a:r>
-              <a:rPr lang="en-US" b="1" u="sng" dirty="0"/>
-              <a:t> “root”</a:t>
-            </a:r>
-            <a:r>
-              <a:rPr lang="en-US" dirty="0"/>
-              <a:t>.</a:t>
-            </a:r>
-          </a:p>
-          <a:p>
-            <a:endParaRPr lang="en-US" dirty="0"/>
-          </a:p>
-          <a:p>
-            <a:endParaRPr lang="pt-BR" dirty="0"/>
-          </a:p>
-        </p:txBody>
-      </p:sp>
-    </p:spTree>
-    <p:extLst>
-      <p:ext uri="{BB962C8B-B14F-4D97-AF65-F5344CB8AC3E}">
-        <p14:creationId xmlns:p14="http://schemas.microsoft.com/office/powerpoint/2010/main" val="3734812818"/>
       </p:ext>
     </p:extLst>
   </p:cSld>

</xml_diff>

<commit_message>
fix: remove duplicated question and add new one into ´IntroduçãoBD.pdf´
</commit_message>
<xml_diff>
--- a/Aula 02/IntroduçãoBD.pptx
+++ b/Aula 02/IntroduçãoBD.pptx
@@ -276,7 +276,7 @@
           <a:p>
             <a:fld id="{0293E696-207E-4958-8130-FF51108F7A86}" type="datetimeFigureOut">
               <a:rPr lang="pt-BR" smtClean="0"/>
-              <a:t>19/02/2026</a:t>
+              <a:t>26/02/2026</a:t>
             </a:fld>
             <a:endParaRPr lang="pt-BR"/>
           </a:p>
@@ -474,7 +474,7 @@
           <a:p>
             <a:fld id="{0293E696-207E-4958-8130-FF51108F7A86}" type="datetimeFigureOut">
               <a:rPr lang="pt-BR" smtClean="0"/>
-              <a:t>19/02/2026</a:t>
+              <a:t>26/02/2026</a:t>
             </a:fld>
             <a:endParaRPr lang="pt-BR"/>
           </a:p>
@@ -682,7 +682,7 @@
           <a:p>
             <a:fld id="{0293E696-207E-4958-8130-FF51108F7A86}" type="datetimeFigureOut">
               <a:rPr lang="pt-BR" smtClean="0"/>
-              <a:t>19/02/2026</a:t>
+              <a:t>26/02/2026</a:t>
             </a:fld>
             <a:endParaRPr lang="pt-BR"/>
           </a:p>
@@ -880,7 +880,7 @@
           <a:p>
             <a:fld id="{0293E696-207E-4958-8130-FF51108F7A86}" type="datetimeFigureOut">
               <a:rPr lang="pt-BR" smtClean="0"/>
-              <a:t>19/02/2026</a:t>
+              <a:t>26/02/2026</a:t>
             </a:fld>
             <a:endParaRPr lang="pt-BR"/>
           </a:p>
@@ -1155,7 +1155,7 @@
           <a:p>
             <a:fld id="{0293E696-207E-4958-8130-FF51108F7A86}" type="datetimeFigureOut">
               <a:rPr lang="pt-BR" smtClean="0"/>
-              <a:t>19/02/2026</a:t>
+              <a:t>26/02/2026</a:t>
             </a:fld>
             <a:endParaRPr lang="pt-BR"/>
           </a:p>
@@ -1420,7 +1420,7 @@
           <a:p>
             <a:fld id="{0293E696-207E-4958-8130-FF51108F7A86}" type="datetimeFigureOut">
               <a:rPr lang="pt-BR" smtClean="0"/>
-              <a:t>19/02/2026</a:t>
+              <a:t>26/02/2026</a:t>
             </a:fld>
             <a:endParaRPr lang="pt-BR"/>
           </a:p>
@@ -1832,7 +1832,7 @@
           <a:p>
             <a:fld id="{0293E696-207E-4958-8130-FF51108F7A86}" type="datetimeFigureOut">
               <a:rPr lang="pt-BR" smtClean="0"/>
-              <a:t>19/02/2026</a:t>
+              <a:t>26/02/2026</a:t>
             </a:fld>
             <a:endParaRPr lang="pt-BR"/>
           </a:p>
@@ -1973,7 +1973,7 @@
           <a:p>
             <a:fld id="{0293E696-207E-4958-8130-FF51108F7A86}" type="datetimeFigureOut">
               <a:rPr lang="pt-BR" smtClean="0"/>
-              <a:t>19/02/2026</a:t>
+              <a:t>26/02/2026</a:t>
             </a:fld>
             <a:endParaRPr lang="pt-BR"/>
           </a:p>
@@ -2086,7 +2086,7 @@
           <a:p>
             <a:fld id="{0293E696-207E-4958-8130-FF51108F7A86}" type="datetimeFigureOut">
               <a:rPr lang="pt-BR" smtClean="0"/>
-              <a:t>19/02/2026</a:t>
+              <a:t>26/02/2026</a:t>
             </a:fld>
             <a:endParaRPr lang="pt-BR"/>
           </a:p>
@@ -2397,7 +2397,7 @@
           <a:p>
             <a:fld id="{0293E696-207E-4958-8130-FF51108F7A86}" type="datetimeFigureOut">
               <a:rPr lang="pt-BR" smtClean="0"/>
-              <a:t>19/02/2026</a:t>
+              <a:t>26/02/2026</a:t>
             </a:fld>
             <a:endParaRPr lang="pt-BR"/>
           </a:p>
@@ -2685,7 +2685,7 @@
           <a:p>
             <a:fld id="{0293E696-207E-4958-8130-FF51108F7A86}" type="datetimeFigureOut">
               <a:rPr lang="pt-BR" smtClean="0"/>
-              <a:t>19/02/2026</a:t>
+              <a:t>26/02/2026</a:t>
             </a:fld>
             <a:endParaRPr lang="pt-BR"/>
           </a:p>
@@ -2926,7 +2926,7 @@
           <a:p>
             <a:fld id="{0293E696-207E-4958-8130-FF51108F7A86}" type="datetimeFigureOut">
               <a:rPr lang="pt-BR" smtClean="0"/>
-              <a:t>19/02/2026</a:t>
+              <a:t>26/02/2026</a:t>
             </a:fld>
             <a:endParaRPr lang="pt-BR"/>
           </a:p>
@@ -6268,7 +6268,7 @@
         <p:spPr>
           <a:xfrm>
             <a:off x="1413130" y="1581520"/>
-            <a:ext cx="9365737" cy="2862322"/>
+            <a:ext cx="9365737" cy="3785652"/>
           </a:xfrm>
           <a:prstGeom prst="rect">
             <a:avLst/>
@@ -6287,15 +6287,7 @@
             </a:pPr>
             <a:r>
               <a:rPr lang="pt-BR" sz="2000" dirty="0"/>
-              <a:t>Se você precisa guardar apenas "Sim" ou "Não", por que usar um campo de texto livre (VARCHAR) seria uma má escolha de </a:t>
-            </a:r>
-            <a:r>
-              <a:rPr lang="pt-BR" sz="2000" dirty="0" err="1"/>
-              <a:t>modelagem?Por</a:t>
-            </a:r>
-            <a:r>
-              <a:rPr lang="pt-BR" sz="2000" dirty="0"/>
-              <a:t> que não é recomendável usar o nome completo de uma pessoa como Chave Primária (PK), mesmo que, no momento do cadastro, não existam nomes iguais?</a:t>
+              <a:t>Se você precisa guardar apenas "Sim" ou "Não", por que usar um campo de texto livre (VARCHAR) seria uma má escolha de modelagem? </a:t>
             </a:r>
           </a:p>
           <a:p>
@@ -6317,6 +6309,23 @@
               <a:rPr lang="pt-BR" sz="2000" dirty="0"/>
               <a:t>Por que as Chaves Estrangeiras são vitais para evitar que o banco de dados se torne um amontoado de "dados órfãos" (informações que existem, mas não se ligam a nada)?</a:t>
             </a:r>
+          </a:p>
+          <a:p>
+            <a:pPr marL="285750" indent="-285750">
+              <a:buFont typeface="Wingdings" panose="05000000000000000000" pitchFamily="2" charset="2"/>
+              <a:buChar char="q"/>
+            </a:pPr>
+            <a:r>
+              <a:rPr lang="pt-BR" sz="2000" dirty="0"/>
+              <a:t>Pense no contexto de uma empresa, um empregado tem um dependente (filho), qual a relação da empresa com este dependente? O que aconteceria com o dependente se o empregado fosse demitido? Dentro da relação entre empregado e dependente, em qual das entidades ficaria a chave estrangeira? Por que?</a:t>
+            </a:r>
+          </a:p>
+          <a:p>
+            <a:pPr marL="285750" indent="-285750">
+              <a:buFont typeface="Wingdings" panose="05000000000000000000" pitchFamily="2" charset="2"/>
+              <a:buChar char="q"/>
+            </a:pPr>
+            <a:endParaRPr lang="pt-BR" sz="2000" dirty="0"/>
           </a:p>
         </p:txBody>
       </p:sp>

</xml_diff>